<commit_message>
Create sections of proposal
</commit_message>
<xml_diff>
--- a/Docs/Proposal_v0.0.1.pptx
+++ b/Docs/Proposal_v0.0.1.pptx
@@ -8,6 +8,17 @@
     <p:sldId id="256" r:id="rId2"/>
     <p:sldId id="258" r:id="rId3"/>
     <p:sldId id="257" r:id="rId4"/>
+    <p:sldId id="259" r:id="rId5"/>
+    <p:sldId id="260" r:id="rId6"/>
+    <p:sldId id="261" r:id="rId7"/>
+    <p:sldId id="262" r:id="rId8"/>
+    <p:sldId id="263" r:id="rId9"/>
+    <p:sldId id="264" r:id="rId10"/>
+    <p:sldId id="265" r:id="rId11"/>
+    <p:sldId id="266" r:id="rId12"/>
+    <p:sldId id="267" r:id="rId13"/>
+    <p:sldId id="269" r:id="rId14"/>
+    <p:sldId id="268" r:id="rId15"/>
   </p:sldIdLst>
   <p:sldSz cx="12192000" cy="6858000"/>
   <p:notesSz cx="6858000" cy="9144000"/>
@@ -106,6 +117,11 @@
       </a:defRPr>
     </a:lvl9pPr>
   </p:defaultTextStyle>
+  <p:extLst>
+    <p:ext uri="{EFAFB233-063F-42B5-8137-9DF3F51BA10A}">
+      <p15:sldGuideLst xmlns:p15="http://schemas.microsoft.com/office/powerpoint/2012/main"/>
+    </p:ext>
+  </p:extLst>
 </p:presentation>
 </file>
 
@@ -248,7 +264,7 @@
           <a:p>
             <a:fld id="{48A87A34-81AB-432B-8DAE-1953F412C126}" type="datetimeFigureOut">
               <a:rPr lang="en-US" dirty="0"/>
-              <a:t>6/4/21</a:t>
+              <a:t>6/8/21</a:t>
             </a:fld>
             <a:endParaRPr lang="en-US" dirty="0"/>
           </a:p>
@@ -454,7 +470,7 @@
           <a:p>
             <a:fld id="{48A87A34-81AB-432B-8DAE-1953F412C126}" type="datetimeFigureOut">
               <a:rPr lang="en-US" dirty="0"/>
-              <a:t>6/4/21</a:t>
+              <a:t>6/8/21</a:t>
             </a:fld>
             <a:endParaRPr lang="en-US" dirty="0"/>
           </a:p>
@@ -664,7 +680,7 @@
           <a:p>
             <a:fld id="{48A87A34-81AB-432B-8DAE-1953F412C126}" type="datetimeFigureOut">
               <a:rPr lang="en-US" dirty="0"/>
-              <a:t>6/4/21</a:t>
+              <a:t>6/8/21</a:t>
             </a:fld>
             <a:endParaRPr lang="en-US" dirty="0"/>
           </a:p>
@@ -860,7 +876,7 @@
           <a:p>
             <a:fld id="{48A87A34-81AB-432B-8DAE-1953F412C126}" type="datetimeFigureOut">
               <a:rPr lang="en-US" dirty="0"/>
-              <a:t>6/4/21</a:t>
+              <a:t>6/8/21</a:t>
             </a:fld>
             <a:endParaRPr lang="en-US" dirty="0"/>
           </a:p>
@@ -1134,7 +1150,7 @@
           <a:p>
             <a:fld id="{48A87A34-81AB-432B-8DAE-1953F412C126}" type="datetimeFigureOut">
               <a:rPr lang="en-US" dirty="0"/>
-              <a:t>6/4/21</a:t>
+              <a:t>6/8/21</a:t>
             </a:fld>
             <a:endParaRPr lang="en-US" dirty="0"/>
           </a:p>
@@ -1397,7 +1413,7 @@
           <a:p>
             <a:fld id="{48A87A34-81AB-432B-8DAE-1953F412C126}" type="datetimeFigureOut">
               <a:rPr lang="en-US" dirty="0"/>
-              <a:t>6/4/21</a:t>
+              <a:t>6/8/21</a:t>
             </a:fld>
             <a:endParaRPr lang="en-US" dirty="0"/>
           </a:p>
@@ -1808,7 +1824,7 @@
           <a:p>
             <a:fld id="{48A87A34-81AB-432B-8DAE-1953F412C126}" type="datetimeFigureOut">
               <a:rPr lang="en-US" dirty="0"/>
-              <a:t>6/4/21</a:t>
+              <a:t>6/8/21</a:t>
             </a:fld>
             <a:endParaRPr lang="en-US" dirty="0"/>
           </a:p>
@@ -1952,7 +1968,7 @@
           <a:p>
             <a:fld id="{48A87A34-81AB-432B-8DAE-1953F412C126}" type="datetimeFigureOut">
               <a:rPr lang="en-US" dirty="0"/>
-              <a:t>6/4/21</a:t>
+              <a:t>6/8/21</a:t>
             </a:fld>
             <a:endParaRPr lang="en-US" dirty="0"/>
           </a:p>
@@ -2073,7 +2089,7 @@
           <a:p>
             <a:fld id="{48A87A34-81AB-432B-8DAE-1953F412C126}" type="datetimeFigureOut">
               <a:rPr lang="en-US" dirty="0"/>
-              <a:t>6/4/21</a:t>
+              <a:t>6/8/21</a:t>
             </a:fld>
             <a:endParaRPr lang="en-US" dirty="0"/>
           </a:p>
@@ -2319,7 +2335,7 @@
           <a:p>
             <a:fld id="{48A87A34-81AB-432B-8DAE-1953F412C126}" type="datetimeFigureOut">
               <a:rPr lang="en-US" dirty="0"/>
-              <a:t>6/4/21</a:t>
+              <a:t>6/8/21</a:t>
             </a:fld>
             <a:endParaRPr lang="en-US" dirty="0"/>
           </a:p>
@@ -2760,7 +2776,7 @@
             <a:fld id="{48A87A34-81AB-432B-8DAE-1953F412C126}" type="datetimeFigureOut">
               <a:rPr lang="en-US" dirty="0"/>
               <a:pPr/>
-              <a:t>6/4/21</a:t>
+              <a:t>6/8/21</a:t>
             </a:fld>
             <a:endParaRPr lang="en-US" dirty="0"/>
           </a:p>
@@ -3083,7 +3099,7 @@
             <a:fld id="{48A87A34-81AB-432B-8DAE-1953F412C126}" type="datetimeFigureOut">
               <a:rPr lang="en-US" dirty="0"/>
               <a:pPr/>
-              <a:t>6/4/21</a:t>
+              <a:t>6/8/21</a:t>
             </a:fld>
             <a:endParaRPr lang="en-US" dirty="0"/>
           </a:p>
@@ -3581,7 +3597,14 @@
             <p:ph type="ctrTitle"/>
           </p:nvPr>
         </p:nvSpPr>
-        <p:spPr/>
+        <p:spPr>
+          <a:solidFill>
+            <a:schemeClr val="tx1">
+              <a:lumMod val="95000"/>
+              <a:lumOff val="5000"/>
+            </a:schemeClr>
+          </a:solidFill>
+        </p:spPr>
         <p:txBody>
           <a:bodyPr>
             <a:normAutofit/>
@@ -3590,38 +3613,33 @@
           <a:p>
             <a:pPr algn="ctr"/>
             <a:r>
-              <a:rPr lang="en-JP" sz="6000" b="1" cap="none" dirty="0">
-                <a:latin typeface="Hiragino Kaku Gothic Pro W3" panose="020B0300000000000000" pitchFamily="34" charset="-128"/>
-                <a:ea typeface="Hiragino Kaku Gothic Pro W3" panose="020B0300000000000000" pitchFamily="34" charset="-128"/>
+              <a:rPr lang="en-JP" b="1" cap="none" dirty="0">
+                <a:solidFill>
+                  <a:schemeClr val="bg1"/>
+                </a:solidFill>
+                <a:latin typeface="Bell MT" panose="02020503060305020303" pitchFamily="18" charset="77"/>
                 <a:cs typeface="Al Tarikh" pitchFamily="2" charset="-78"/>
               </a:rPr>
-              <a:t>Hack</a:t>
+              <a:t>UNITY-CHAN</a:t>
             </a:r>
             <a:br>
               <a:rPr lang="en-JP" b="1" cap="none" dirty="0">
+                <a:solidFill>
+                  <a:schemeClr val="bg1"/>
+                </a:solidFill>
                 <a:latin typeface="Bell MT" panose="02020503060305020303" pitchFamily="18" charset="77"/>
                 <a:cs typeface="Al Tarikh" pitchFamily="2" charset="-78"/>
               </a:rPr>
             </a:br>
             <a:r>
-              <a:rPr lang="en-JP" sz="3600" b="1" cap="none" dirty="0">
+              <a:rPr lang="en-JP" b="1" i="1" cap="none" dirty="0">
+                <a:solidFill>
+                  <a:schemeClr val="bg1"/>
+                </a:solidFill>
                 <a:latin typeface="Bell MT" panose="02020503060305020303" pitchFamily="18" charset="77"/>
                 <a:cs typeface="Al Tarikh" pitchFamily="2" charset="-78"/>
               </a:rPr>
-              <a:t>and…</a:t>
-            </a:r>
-            <a:br>
-              <a:rPr lang="en-JP" b="1" cap="none" dirty="0">
-                <a:latin typeface="Bell MT" panose="02020503060305020303" pitchFamily="18" charset="77"/>
-                <a:cs typeface="Al Tarikh" pitchFamily="2" charset="-78"/>
-              </a:rPr>
-            </a:br>
-            <a:r>
-              <a:rPr lang="en-JP" b="1" i="1" cap="none" dirty="0">
-                <a:latin typeface="Bell MT" panose="02020503060305020303" pitchFamily="18" charset="77"/>
-                <a:cs typeface="Al Tarikh" pitchFamily="2" charset="-78"/>
-              </a:rPr>
-              <a:t>Brandish!!</a:t>
+              <a:t>Slash!!</a:t>
             </a:r>
           </a:p>
         </p:txBody>
@@ -3676,6 +3694,426 @@
     <p:extLst>
       <p:ext uri="{BB962C8B-B14F-4D97-AF65-F5344CB8AC3E}">
         <p14:creationId xmlns:p14="http://schemas.microsoft.com/office/powerpoint/2010/main" val="809221457"/>
+      </p:ext>
+    </p:extLst>
+  </p:cSld>
+  <p:clrMapOvr>
+    <a:masterClrMapping/>
+  </p:clrMapOvr>
+</p:sld>
+</file>
+
+<file path=ppt/slides/slide10.xml><?xml version="1.0" encoding="utf-8"?>
+<p:sld xmlns:a="http://schemas.openxmlformats.org/drawingml/2006/main" xmlns:r="http://schemas.openxmlformats.org/officeDocument/2006/relationships" xmlns:p="http://schemas.openxmlformats.org/presentationml/2006/main">
+  <p:cSld>
+    <p:spTree>
+      <p:nvGrpSpPr>
+        <p:cNvPr id="1" name=""/>
+        <p:cNvGrpSpPr/>
+        <p:nvPr/>
+      </p:nvGrpSpPr>
+      <p:grpSpPr>
+        <a:xfrm>
+          <a:off x="0" y="0"/>
+          <a:ext cx="0" cy="0"/>
+          <a:chOff x="0" y="0"/>
+          <a:chExt cx="0" cy="0"/>
+        </a:xfrm>
+      </p:grpSpPr>
+      <p:sp>
+        <p:nvSpPr>
+          <p:cNvPr id="2" name="Title 1">
+            <a:extLst>
+              <a:ext uri="{FF2B5EF4-FFF2-40B4-BE49-F238E27FC236}">
+                <a16:creationId xmlns:a16="http://schemas.microsoft.com/office/drawing/2014/main" id="{D726D3D6-4819-E849-A2C6-5A2B9C083A8F}"/>
+              </a:ext>
+            </a:extLst>
+          </p:cNvPr>
+          <p:cNvSpPr>
+            <a:spLocks noGrp="1"/>
+          </p:cNvSpPr>
+          <p:nvPr>
+            <p:ph type="title"/>
+          </p:nvPr>
+        </p:nvSpPr>
+        <p:spPr/>
+        <p:txBody>
+          <a:bodyPr/>
+          <a:lstStyle/>
+          <a:p>
+            <a:r>
+              <a:rPr lang="ja-JP" altLang="en-US"/>
+              <a:t>どんなアイデアを導入したか？</a:t>
+            </a:r>
+            <a:endParaRPr lang="en-JP" dirty="0"/>
+          </a:p>
+        </p:txBody>
+      </p:sp>
+      <p:sp>
+        <p:nvSpPr>
+          <p:cNvPr id="3" name="Content Placeholder 2">
+            <a:extLst>
+              <a:ext uri="{FF2B5EF4-FFF2-40B4-BE49-F238E27FC236}">
+                <a16:creationId xmlns:a16="http://schemas.microsoft.com/office/drawing/2014/main" id="{3148B329-5B24-E64A-A21C-28CC88B39E67}"/>
+              </a:ext>
+            </a:extLst>
+          </p:cNvPr>
+          <p:cNvSpPr>
+            <a:spLocks noGrp="1"/>
+          </p:cNvSpPr>
+          <p:nvPr>
+            <p:ph idx="1"/>
+          </p:nvPr>
+        </p:nvSpPr>
+        <p:spPr/>
+        <p:txBody>
+          <a:bodyPr/>
+          <a:lstStyle/>
+          <a:p>
+            <a:endParaRPr lang="en-JP"/>
+          </a:p>
+        </p:txBody>
+      </p:sp>
+    </p:spTree>
+    <p:extLst>
+      <p:ext uri="{BB962C8B-B14F-4D97-AF65-F5344CB8AC3E}">
+        <p14:creationId xmlns:p14="http://schemas.microsoft.com/office/powerpoint/2010/main" val="1165214894"/>
+      </p:ext>
+    </p:extLst>
+  </p:cSld>
+  <p:clrMapOvr>
+    <a:masterClrMapping/>
+  </p:clrMapOvr>
+</p:sld>
+</file>
+
+<file path=ppt/slides/slide11.xml><?xml version="1.0" encoding="utf-8"?>
+<p:sld xmlns:a="http://schemas.openxmlformats.org/drawingml/2006/main" xmlns:r="http://schemas.openxmlformats.org/officeDocument/2006/relationships" xmlns:p="http://schemas.openxmlformats.org/presentationml/2006/main">
+  <p:cSld>
+    <p:spTree>
+      <p:nvGrpSpPr>
+        <p:cNvPr id="1" name=""/>
+        <p:cNvGrpSpPr/>
+        <p:nvPr/>
+      </p:nvGrpSpPr>
+      <p:grpSpPr>
+        <a:xfrm>
+          <a:off x="0" y="0"/>
+          <a:ext cx="0" cy="0"/>
+          <a:chOff x="0" y="0"/>
+          <a:chExt cx="0" cy="0"/>
+        </a:xfrm>
+      </p:grpSpPr>
+      <p:sp>
+        <p:nvSpPr>
+          <p:cNvPr id="2" name="Title 1">
+            <a:extLst>
+              <a:ext uri="{FF2B5EF4-FFF2-40B4-BE49-F238E27FC236}">
+                <a16:creationId xmlns:a16="http://schemas.microsoft.com/office/drawing/2014/main" id="{04E45D64-BD70-F246-9532-CA2D9D96B21B}"/>
+              </a:ext>
+            </a:extLst>
+          </p:cNvPr>
+          <p:cNvSpPr>
+            <a:spLocks noGrp="1"/>
+          </p:cNvSpPr>
+          <p:nvPr>
+            <p:ph type="title"/>
+          </p:nvPr>
+        </p:nvSpPr>
+        <p:spPr/>
+        <p:txBody>
+          <a:bodyPr/>
+          <a:lstStyle/>
+          <a:p>
+            <a:r>
+              <a:rPr lang="ja-JP" altLang="en-US"/>
+              <a:t>制御フロー</a:t>
+            </a:r>
+            <a:endParaRPr lang="en-JP" dirty="0"/>
+          </a:p>
+        </p:txBody>
+      </p:sp>
+      <p:sp>
+        <p:nvSpPr>
+          <p:cNvPr id="3" name="Content Placeholder 2">
+            <a:extLst>
+              <a:ext uri="{FF2B5EF4-FFF2-40B4-BE49-F238E27FC236}">
+                <a16:creationId xmlns:a16="http://schemas.microsoft.com/office/drawing/2014/main" id="{5C8C95B5-4038-D34D-9645-50613F27812C}"/>
+              </a:ext>
+            </a:extLst>
+          </p:cNvPr>
+          <p:cNvSpPr>
+            <a:spLocks noGrp="1"/>
+          </p:cNvSpPr>
+          <p:nvPr>
+            <p:ph idx="1"/>
+          </p:nvPr>
+        </p:nvSpPr>
+        <p:spPr/>
+        <p:txBody>
+          <a:bodyPr/>
+          <a:lstStyle/>
+          <a:p>
+            <a:endParaRPr lang="en-JP"/>
+          </a:p>
+        </p:txBody>
+      </p:sp>
+    </p:spTree>
+    <p:extLst>
+      <p:ext uri="{BB962C8B-B14F-4D97-AF65-F5344CB8AC3E}">
+        <p14:creationId xmlns:p14="http://schemas.microsoft.com/office/powerpoint/2010/main" val="1480662988"/>
+      </p:ext>
+    </p:extLst>
+  </p:cSld>
+  <p:clrMapOvr>
+    <a:masterClrMapping/>
+  </p:clrMapOvr>
+</p:sld>
+</file>
+
+<file path=ppt/slides/slide12.xml><?xml version="1.0" encoding="utf-8"?>
+<p:sld xmlns:a="http://schemas.openxmlformats.org/drawingml/2006/main" xmlns:r="http://schemas.openxmlformats.org/officeDocument/2006/relationships" xmlns:p="http://schemas.openxmlformats.org/presentationml/2006/main">
+  <p:cSld>
+    <p:spTree>
+      <p:nvGrpSpPr>
+        <p:cNvPr id="1" name=""/>
+        <p:cNvGrpSpPr/>
+        <p:nvPr/>
+      </p:nvGrpSpPr>
+      <p:grpSpPr>
+        <a:xfrm>
+          <a:off x="0" y="0"/>
+          <a:ext cx="0" cy="0"/>
+          <a:chOff x="0" y="0"/>
+          <a:chExt cx="0" cy="0"/>
+        </a:xfrm>
+      </p:grpSpPr>
+      <p:sp>
+        <p:nvSpPr>
+          <p:cNvPr id="2" name="Title 1">
+            <a:extLst>
+              <a:ext uri="{FF2B5EF4-FFF2-40B4-BE49-F238E27FC236}">
+                <a16:creationId xmlns:a16="http://schemas.microsoft.com/office/drawing/2014/main" id="{178D8BD7-FAC0-B843-B26A-DDEB49CBFE00}"/>
+              </a:ext>
+            </a:extLst>
+          </p:cNvPr>
+          <p:cNvSpPr>
+            <a:spLocks noGrp="1"/>
+          </p:cNvSpPr>
+          <p:nvPr>
+            <p:ph type="title"/>
+          </p:nvPr>
+        </p:nvSpPr>
+        <p:spPr/>
+        <p:txBody>
+          <a:bodyPr/>
+          <a:lstStyle/>
+          <a:p>
+            <a:r>
+              <a:rPr lang="ja-JP" altLang="en-US"/>
+              <a:t>操作説明</a:t>
+            </a:r>
+            <a:endParaRPr lang="en-JP" dirty="0"/>
+          </a:p>
+        </p:txBody>
+      </p:sp>
+      <p:sp>
+        <p:nvSpPr>
+          <p:cNvPr id="3" name="Content Placeholder 2">
+            <a:extLst>
+              <a:ext uri="{FF2B5EF4-FFF2-40B4-BE49-F238E27FC236}">
+                <a16:creationId xmlns:a16="http://schemas.microsoft.com/office/drawing/2014/main" id="{8C098A3B-3E09-914B-B732-BC7F91C3E872}"/>
+              </a:ext>
+            </a:extLst>
+          </p:cNvPr>
+          <p:cNvSpPr>
+            <a:spLocks noGrp="1"/>
+          </p:cNvSpPr>
+          <p:nvPr>
+            <p:ph idx="1"/>
+          </p:nvPr>
+        </p:nvSpPr>
+        <p:spPr/>
+        <p:txBody>
+          <a:bodyPr/>
+          <a:lstStyle/>
+          <a:p>
+            <a:endParaRPr lang="en-JP" dirty="0"/>
+          </a:p>
+        </p:txBody>
+      </p:sp>
+    </p:spTree>
+    <p:extLst>
+      <p:ext uri="{BB962C8B-B14F-4D97-AF65-F5344CB8AC3E}">
+        <p14:creationId xmlns:p14="http://schemas.microsoft.com/office/powerpoint/2010/main" val="3288302659"/>
+      </p:ext>
+    </p:extLst>
+  </p:cSld>
+  <p:clrMapOvr>
+    <a:masterClrMapping/>
+  </p:clrMapOvr>
+</p:sld>
+</file>
+
+<file path=ppt/slides/slide13.xml><?xml version="1.0" encoding="utf-8"?>
+<p:sld xmlns:a="http://schemas.openxmlformats.org/drawingml/2006/main" xmlns:r="http://schemas.openxmlformats.org/officeDocument/2006/relationships" xmlns:p="http://schemas.openxmlformats.org/presentationml/2006/main">
+  <p:cSld>
+    <p:spTree>
+      <p:nvGrpSpPr>
+        <p:cNvPr id="1" name=""/>
+        <p:cNvGrpSpPr/>
+        <p:nvPr/>
+      </p:nvGrpSpPr>
+      <p:grpSpPr>
+        <a:xfrm>
+          <a:off x="0" y="0"/>
+          <a:ext cx="0" cy="0"/>
+          <a:chOff x="0" y="0"/>
+          <a:chExt cx="0" cy="0"/>
+        </a:xfrm>
+      </p:grpSpPr>
+      <p:sp>
+        <p:nvSpPr>
+          <p:cNvPr id="2" name="Title 1">
+            <a:extLst>
+              <a:ext uri="{FF2B5EF4-FFF2-40B4-BE49-F238E27FC236}">
+                <a16:creationId xmlns:a16="http://schemas.microsoft.com/office/drawing/2014/main" id="{C3A6B6C4-2EA8-7346-8B6C-A946AC3CD9DA}"/>
+              </a:ext>
+            </a:extLst>
+          </p:cNvPr>
+          <p:cNvSpPr>
+            <a:spLocks noGrp="1"/>
+          </p:cNvSpPr>
+          <p:nvPr>
+            <p:ph type="title"/>
+          </p:nvPr>
+        </p:nvSpPr>
+        <p:spPr/>
+        <p:txBody>
+          <a:bodyPr/>
+          <a:lstStyle/>
+          <a:p>
+            <a:r>
+              <a:rPr lang="ja-JP" altLang="en-US"/>
+              <a:t>開発期間</a:t>
+            </a:r>
+            <a:endParaRPr lang="en-JP" dirty="0"/>
+          </a:p>
+        </p:txBody>
+      </p:sp>
+      <p:sp>
+        <p:nvSpPr>
+          <p:cNvPr id="3" name="Content Placeholder 2">
+            <a:extLst>
+              <a:ext uri="{FF2B5EF4-FFF2-40B4-BE49-F238E27FC236}">
+                <a16:creationId xmlns:a16="http://schemas.microsoft.com/office/drawing/2014/main" id="{4A40942B-CB74-9244-8451-4B126A396212}"/>
+              </a:ext>
+            </a:extLst>
+          </p:cNvPr>
+          <p:cNvSpPr>
+            <a:spLocks noGrp="1"/>
+          </p:cNvSpPr>
+          <p:nvPr>
+            <p:ph idx="1"/>
+          </p:nvPr>
+        </p:nvSpPr>
+        <p:spPr/>
+        <p:txBody>
+          <a:bodyPr/>
+          <a:lstStyle/>
+          <a:p>
+            <a:endParaRPr lang="en-JP"/>
+          </a:p>
+        </p:txBody>
+      </p:sp>
+    </p:spTree>
+    <p:extLst>
+      <p:ext uri="{BB962C8B-B14F-4D97-AF65-F5344CB8AC3E}">
+        <p14:creationId xmlns:p14="http://schemas.microsoft.com/office/powerpoint/2010/main" val="604306989"/>
+      </p:ext>
+    </p:extLst>
+  </p:cSld>
+  <p:clrMapOvr>
+    <a:masterClrMapping/>
+  </p:clrMapOvr>
+</p:sld>
+</file>
+
+<file path=ppt/slides/slide14.xml><?xml version="1.0" encoding="utf-8"?>
+<p:sld xmlns:a="http://schemas.openxmlformats.org/drawingml/2006/main" xmlns:r="http://schemas.openxmlformats.org/officeDocument/2006/relationships" xmlns:p="http://schemas.openxmlformats.org/presentationml/2006/main">
+  <p:cSld>
+    <p:spTree>
+      <p:nvGrpSpPr>
+        <p:cNvPr id="1" name=""/>
+        <p:cNvGrpSpPr/>
+        <p:nvPr/>
+      </p:nvGrpSpPr>
+      <p:grpSpPr>
+        <a:xfrm>
+          <a:off x="0" y="0"/>
+          <a:ext cx="0" cy="0"/>
+          <a:chOff x="0" y="0"/>
+          <a:chExt cx="0" cy="0"/>
+        </a:xfrm>
+      </p:grpSpPr>
+      <p:sp>
+        <p:nvSpPr>
+          <p:cNvPr id="2" name="Title 1">
+            <a:extLst>
+              <a:ext uri="{FF2B5EF4-FFF2-40B4-BE49-F238E27FC236}">
+                <a16:creationId xmlns:a16="http://schemas.microsoft.com/office/drawing/2014/main" id="{AE1A5020-A60D-1B45-AD01-57914982BD67}"/>
+              </a:ext>
+            </a:extLst>
+          </p:cNvPr>
+          <p:cNvSpPr>
+            <a:spLocks noGrp="1"/>
+          </p:cNvSpPr>
+          <p:nvPr>
+            <p:ph type="title"/>
+          </p:nvPr>
+        </p:nvSpPr>
+        <p:spPr/>
+        <p:txBody>
+          <a:bodyPr/>
+          <a:lstStyle/>
+          <a:p>
+            <a:r>
+              <a:rPr lang="ja-JP" altLang="en-US"/>
+              <a:t>拡張アイデア</a:t>
+            </a:r>
+            <a:endParaRPr lang="en-JP" dirty="0"/>
+          </a:p>
+        </p:txBody>
+      </p:sp>
+      <p:sp>
+        <p:nvSpPr>
+          <p:cNvPr id="3" name="Content Placeholder 2">
+            <a:extLst>
+              <a:ext uri="{FF2B5EF4-FFF2-40B4-BE49-F238E27FC236}">
+                <a16:creationId xmlns:a16="http://schemas.microsoft.com/office/drawing/2014/main" id="{6CCEA627-7629-2D46-816D-30A7E5AE0E18}"/>
+              </a:ext>
+            </a:extLst>
+          </p:cNvPr>
+          <p:cNvSpPr>
+            <a:spLocks noGrp="1"/>
+          </p:cNvSpPr>
+          <p:nvPr>
+            <p:ph idx="1"/>
+          </p:nvPr>
+        </p:nvSpPr>
+        <p:spPr/>
+        <p:txBody>
+          <a:bodyPr/>
+          <a:lstStyle/>
+          <a:p>
+            <a:endParaRPr lang="en-JP"/>
+          </a:p>
+        </p:txBody>
+      </p:sp>
+    </p:spTree>
+    <p:extLst>
+      <p:ext uri="{BB962C8B-B14F-4D97-AF65-F5344CB8AC3E}">
+        <p14:creationId xmlns:p14="http://schemas.microsoft.com/office/powerpoint/2010/main" val="3519521725"/>
       </p:ext>
     </p:extLst>
   </p:cSld>
@@ -3721,7 +4159,7 @@
         <p:spPr>
           <a:xfrm>
             <a:off x="1451579" y="804519"/>
-            <a:ext cx="2319037" cy="1049235"/>
+            <a:ext cx="9603275" cy="1049235"/>
           </a:xfrm>
         </p:spPr>
         <p:txBody>
@@ -3729,8 +4167,11 @@
           <a:lstStyle/>
           <a:p>
             <a:r>
-              <a:rPr lang="en-JP" dirty="0"/>
-              <a:t>ConCEPT</a:t>
+              <a:rPr lang="en-JP" dirty="0">
+                <a:latin typeface="Yu Gothic" panose="020B0400000000000000" pitchFamily="34" charset="-128"/>
+                <a:ea typeface="Yu Gothic" panose="020B0400000000000000" pitchFamily="34" charset="-128"/>
+              </a:rPr>
+              <a:t>開発コンセプト</a:t>
             </a:r>
           </a:p>
         </p:txBody>
@@ -3753,64 +4194,54 @@
         </p:nvSpPr>
         <p:spPr/>
         <p:txBody>
-          <a:bodyPr/>
-          <a:lstStyle/>
-          <a:p>
-            <a:endParaRPr lang="en-JP" dirty="0"/>
-          </a:p>
-        </p:txBody>
-      </p:sp>
-      <p:sp>
-        <p:nvSpPr>
-          <p:cNvPr id="4" name="Title 1">
-            <a:extLst>
-              <a:ext uri="{FF2B5EF4-FFF2-40B4-BE49-F238E27FC236}">
-                <a16:creationId xmlns:a16="http://schemas.microsoft.com/office/drawing/2014/main" id="{17E2F9C6-6F27-074A-9285-1757B4E42D69}"/>
-              </a:ext>
-            </a:extLst>
-          </p:cNvPr>
-          <p:cNvSpPr txBox="1">
-            <a:spLocks/>
-          </p:cNvSpPr>
-          <p:nvPr/>
-        </p:nvSpPr>
-        <p:spPr>
-          <a:xfrm>
-            <a:off x="4110874" y="804519"/>
-            <a:ext cx="6943980" cy="1049235"/>
-          </a:xfrm>
-          <a:prstGeom prst="rect">
-            <a:avLst/>
-          </a:prstGeom>
-        </p:spPr>
-        <p:txBody>
-          <a:bodyPr vert="horz" lIns="91440" tIns="45720" rIns="91440" bIns="45720" rtlCol="0" anchor="ctr">
-            <a:noAutofit/>
-          </a:bodyPr>
-          <a:lstStyle>
-            <a:lvl1pPr algn="l" defTabSz="914400" rtl="0" eaLnBrk="1" latinLnBrk="0" hangingPunct="1">
-              <a:lnSpc>
-                <a:spcPct val="90000"/>
-              </a:lnSpc>
-              <a:spcBef>
-                <a:spcPct val="0"/>
-              </a:spcBef>
-              <a:buNone/>
-              <a:defRPr sz="3200" b="0" i="0" kern="1200" cap="all">
+          <a:bodyPr anchor="ctr"/>
+          <a:lstStyle/>
+          <a:p>
+            <a:pPr marL="0" indent="0" algn="ctr">
+              <a:buNone/>
+            </a:pPr>
+            <a:r>
+              <a:rPr lang="en-JP" dirty="0"/>
+              <a:t>この世に</a:t>
+            </a:r>
+            <a:r>
+              <a:rPr lang="en-JP" dirty="0">
                 <a:solidFill>
-                  <a:schemeClr val="tx1"/>
+                  <a:srgbClr val="0070C0"/>
                 </a:solidFill>
-                <a:effectLst/>
-                <a:latin typeface="+mj-lt"/>
-                <a:ea typeface="+mj-ea"/>
-                <a:cs typeface="+mj-cs"/>
-              </a:defRPr>
-            </a:lvl1pPr>
-          </a:lstStyle>
-          <a:p>
-            <a:r>
-              <a:rPr lang="en-JP" sz="6000" cap="none" dirty="0"/>
-              <a:t>Brrrrrrr</a:t>
+              </a:rPr>
+              <a:t>マウス</a:t>
+            </a:r>
+            <a:r>
+              <a:rPr lang="en-JP" dirty="0"/>
+              <a:t>の普及と共に生まれた</a:t>
+            </a:r>
+            <a:r>
+              <a:rPr lang="en-JP" dirty="0">
+                <a:solidFill>
+                  <a:srgbClr val="FF0000"/>
+                </a:solidFill>
+              </a:rPr>
+              <a:t>あの怪作</a:t>
+            </a:r>
+            <a:r>
+              <a:rPr lang="en-JP" dirty="0"/>
+              <a:t>を</a:t>
+            </a:r>
+            <a:br>
+              <a:rPr lang="en-JP" dirty="0"/>
+            </a:br>
+            <a:r>
+              <a:rPr lang="en-JP" dirty="0">
+                <a:solidFill>
+                  <a:srgbClr val="0070C0"/>
+                </a:solidFill>
+              </a:rPr>
+              <a:t>タップ操作</a:t>
+            </a:r>
+            <a:r>
+              <a:rPr lang="en-JP" dirty="0"/>
+              <a:t>で現代によみがえらせる！！</a:t>
             </a:r>
           </a:p>
         </p:txBody>
@@ -3872,9 +4303,16 @@
           <a:lstStyle/>
           <a:p>
             <a:r>
-              <a:rPr lang="en-JP" dirty="0"/>
-              <a:t>ワードクラウド？</a:t>
-            </a:r>
+              <a:rPr lang="ja-JP" altLang="en-US">
+                <a:latin typeface="Yu Gothic" panose="020B0400000000000000" pitchFamily="34" charset="-128"/>
+                <a:ea typeface="Yu Gothic" panose="020B0400000000000000" pitchFamily="34" charset="-128"/>
+              </a:rPr>
+              <a:t>画面イメージ</a:t>
+            </a:r>
+            <a:endParaRPr lang="en-JP" dirty="0">
+              <a:latin typeface="Yu Gothic" panose="020B0400000000000000" pitchFamily="34" charset="-128"/>
+              <a:ea typeface="Yu Gothic" panose="020B0400000000000000" pitchFamily="34" charset="-128"/>
+            </a:endParaRPr>
           </a:p>
         </p:txBody>
       </p:sp>
@@ -3894,7 +4332,12 @@
             <p:ph idx="1"/>
           </p:nvPr>
         </p:nvSpPr>
-        <p:spPr/>
+        <p:spPr>
+          <a:xfrm>
+            <a:off x="2823588" y="1998147"/>
+            <a:ext cx="2528834" cy="3450613"/>
+          </a:xfrm>
+        </p:spPr>
         <p:txBody>
           <a:bodyPr/>
           <a:lstStyle/>
@@ -3903,10 +4346,854 @@
           </a:p>
         </p:txBody>
       </p:sp>
+      <p:sp>
+        <p:nvSpPr>
+          <p:cNvPr id="13" name="Rounded Rectangle 12">
+            <a:extLst>
+              <a:ext uri="{FF2B5EF4-FFF2-40B4-BE49-F238E27FC236}">
+                <a16:creationId xmlns:a16="http://schemas.microsoft.com/office/drawing/2014/main" id="{BBE55EDF-2B51-DC42-B697-88BB8030D1F3}"/>
+              </a:ext>
+            </a:extLst>
+          </p:cNvPr>
+          <p:cNvSpPr/>
+          <p:nvPr/>
+        </p:nvSpPr>
+        <p:spPr>
+          <a:xfrm>
+            <a:off x="874208" y="1998147"/>
+            <a:ext cx="1838848" cy="3468198"/>
+          </a:xfrm>
+          <a:prstGeom prst="roundRect">
+            <a:avLst/>
+          </a:prstGeom>
+        </p:spPr>
+        <p:style>
+          <a:lnRef idx="2">
+            <a:schemeClr val="accent1">
+              <a:shade val="50000"/>
+            </a:schemeClr>
+          </a:lnRef>
+          <a:fillRef idx="1">
+            <a:schemeClr val="accent1"/>
+          </a:fillRef>
+          <a:effectRef idx="0">
+            <a:schemeClr val="accent1"/>
+          </a:effectRef>
+          <a:fontRef idx="minor">
+            <a:schemeClr val="lt1"/>
+          </a:fontRef>
+        </p:style>
+        <p:txBody>
+          <a:bodyPr rtlCol="0" anchor="ctr"/>
+          <a:lstStyle/>
+          <a:p>
+            <a:pPr algn="ctr"/>
+            <a:r>
+              <a:rPr lang="en-JP" dirty="0"/>
+              <a:t>Moving image</a:t>
+            </a:r>
+          </a:p>
+        </p:txBody>
+      </p:sp>
+      <p:sp>
+        <p:nvSpPr>
+          <p:cNvPr id="15" name="Rounded Rectangle 14">
+            <a:extLst>
+              <a:ext uri="{FF2B5EF4-FFF2-40B4-BE49-F238E27FC236}">
+                <a16:creationId xmlns:a16="http://schemas.microsoft.com/office/drawing/2014/main" id="{1966BA71-2F1D-B14F-AF33-70FAD0DA8D31}"/>
+              </a:ext>
+            </a:extLst>
+          </p:cNvPr>
+          <p:cNvSpPr/>
+          <p:nvPr/>
+        </p:nvSpPr>
+        <p:spPr>
+          <a:xfrm>
+            <a:off x="6391586" y="1998147"/>
+            <a:ext cx="1838848" cy="3468198"/>
+          </a:xfrm>
+          <a:prstGeom prst="roundRect">
+            <a:avLst/>
+          </a:prstGeom>
+        </p:spPr>
+        <p:style>
+          <a:lnRef idx="2">
+            <a:schemeClr val="accent1">
+              <a:shade val="50000"/>
+            </a:schemeClr>
+          </a:lnRef>
+          <a:fillRef idx="1">
+            <a:schemeClr val="accent1"/>
+          </a:fillRef>
+          <a:effectRef idx="0">
+            <a:schemeClr val="accent1"/>
+          </a:effectRef>
+          <a:fontRef idx="minor">
+            <a:schemeClr val="lt1"/>
+          </a:fontRef>
+        </p:style>
+        <p:txBody>
+          <a:bodyPr rtlCol="0" anchor="ctr"/>
+          <a:lstStyle/>
+          <a:p>
+            <a:pPr algn="ctr"/>
+            <a:r>
+              <a:rPr lang="en-JP" dirty="0"/>
+              <a:t>Fighting UI</a:t>
+            </a:r>
+          </a:p>
+        </p:txBody>
+      </p:sp>
+      <p:cxnSp>
+        <p:nvCxnSpPr>
+          <p:cNvPr id="17" name="Straight Connector 16">
+            <a:extLst>
+              <a:ext uri="{FF2B5EF4-FFF2-40B4-BE49-F238E27FC236}">
+                <a16:creationId xmlns:a16="http://schemas.microsoft.com/office/drawing/2014/main" id="{236BCCAF-EE1F-CE46-8950-69D1F2255C42}"/>
+              </a:ext>
+            </a:extLst>
+          </p:cNvPr>
+          <p:cNvCxnSpPr>
+            <a:cxnSpLocks/>
+          </p:cNvCxnSpPr>
+          <p:nvPr/>
+        </p:nvCxnSpPr>
+        <p:spPr>
+          <a:xfrm>
+            <a:off x="5878286" y="2833635"/>
+            <a:ext cx="0" cy="2049864"/>
+          </a:xfrm>
+          <a:prstGeom prst="line">
+            <a:avLst/>
+          </a:prstGeom>
+        </p:spPr>
+        <p:style>
+          <a:lnRef idx="1">
+            <a:schemeClr val="accent1"/>
+          </a:lnRef>
+          <a:fillRef idx="0">
+            <a:schemeClr val="accent1"/>
+          </a:fillRef>
+          <a:effectRef idx="0">
+            <a:schemeClr val="accent1"/>
+          </a:effectRef>
+          <a:fontRef idx="minor">
+            <a:schemeClr val="tx1"/>
+          </a:fontRef>
+        </p:style>
+      </p:cxnSp>
     </p:spTree>
     <p:extLst>
       <p:ext uri="{BB962C8B-B14F-4D97-AF65-F5344CB8AC3E}">
         <p14:creationId xmlns:p14="http://schemas.microsoft.com/office/powerpoint/2010/main" val="3409096666"/>
+      </p:ext>
+    </p:extLst>
+  </p:cSld>
+  <p:clrMapOvr>
+    <a:masterClrMapping/>
+  </p:clrMapOvr>
+</p:sld>
+</file>
+
+<file path=ppt/slides/slide4.xml><?xml version="1.0" encoding="utf-8"?>
+<p:sld xmlns:a="http://schemas.openxmlformats.org/drawingml/2006/main" xmlns:r="http://schemas.openxmlformats.org/officeDocument/2006/relationships" xmlns:p="http://schemas.openxmlformats.org/presentationml/2006/main">
+  <p:cSld>
+    <p:spTree>
+      <p:nvGrpSpPr>
+        <p:cNvPr id="1" name=""/>
+        <p:cNvGrpSpPr/>
+        <p:nvPr/>
+      </p:nvGrpSpPr>
+      <p:grpSpPr>
+        <a:xfrm>
+          <a:off x="0" y="0"/>
+          <a:ext cx="0" cy="0"/>
+          <a:chOff x="0" y="0"/>
+          <a:chExt cx="0" cy="0"/>
+        </a:xfrm>
+      </p:grpSpPr>
+      <p:sp>
+        <p:nvSpPr>
+          <p:cNvPr id="2" name="Title 1">
+            <a:extLst>
+              <a:ext uri="{FF2B5EF4-FFF2-40B4-BE49-F238E27FC236}">
+                <a16:creationId xmlns:a16="http://schemas.microsoft.com/office/drawing/2014/main" id="{AA686CA0-1EAB-524E-81EE-3AC308AA15EF}"/>
+              </a:ext>
+            </a:extLst>
+          </p:cNvPr>
+          <p:cNvSpPr>
+            <a:spLocks noGrp="1"/>
+          </p:cNvSpPr>
+          <p:nvPr>
+            <p:ph type="title"/>
+          </p:nvPr>
+        </p:nvSpPr>
+        <p:spPr>
+          <a:xfrm>
+            <a:off x="1451579" y="804519"/>
+            <a:ext cx="9603275" cy="1049235"/>
+          </a:xfrm>
+        </p:spPr>
+        <p:txBody>
+          <a:bodyPr/>
+          <a:lstStyle/>
+          <a:p>
+            <a:r>
+              <a:rPr lang="ja-JP" altLang="en-US">
+                <a:latin typeface="Yu Gothic" panose="020B0400000000000000" pitchFamily="34" charset="-128"/>
+                <a:ea typeface="Yu Gothic" panose="020B0400000000000000" pitchFamily="34" charset="-128"/>
+              </a:rPr>
+              <a:t>横画面</a:t>
+            </a:r>
+            <a:r>
+              <a:rPr lang="en-US" altLang="ja-JP" dirty="0">
+                <a:latin typeface="Yu Gothic" panose="020B0400000000000000" pitchFamily="34" charset="-128"/>
+                <a:ea typeface="Yu Gothic" panose="020B0400000000000000" pitchFamily="34" charset="-128"/>
+              </a:rPr>
+              <a:t> UI</a:t>
+            </a:r>
+            <a:endParaRPr lang="en-JP" dirty="0">
+              <a:latin typeface="Yu Gothic" panose="020B0400000000000000" pitchFamily="34" charset="-128"/>
+              <a:ea typeface="Yu Gothic" panose="020B0400000000000000" pitchFamily="34" charset="-128"/>
+            </a:endParaRPr>
+          </a:p>
+        </p:txBody>
+      </p:sp>
+      <p:sp>
+        <p:nvSpPr>
+          <p:cNvPr id="13" name="Rounded Rectangle 12">
+            <a:extLst>
+              <a:ext uri="{FF2B5EF4-FFF2-40B4-BE49-F238E27FC236}">
+                <a16:creationId xmlns:a16="http://schemas.microsoft.com/office/drawing/2014/main" id="{BBE55EDF-2B51-DC42-B697-88BB8030D1F3}"/>
+              </a:ext>
+            </a:extLst>
+          </p:cNvPr>
+          <p:cNvSpPr/>
+          <p:nvPr/>
+        </p:nvSpPr>
+        <p:spPr>
+          <a:xfrm>
+            <a:off x="874208" y="3547067"/>
+            <a:ext cx="1075172" cy="1919277"/>
+          </a:xfrm>
+          <a:prstGeom prst="roundRect">
+            <a:avLst/>
+          </a:prstGeom>
+        </p:spPr>
+        <p:style>
+          <a:lnRef idx="2">
+            <a:schemeClr val="accent1">
+              <a:shade val="50000"/>
+            </a:schemeClr>
+          </a:lnRef>
+          <a:fillRef idx="1">
+            <a:schemeClr val="accent1"/>
+          </a:fillRef>
+          <a:effectRef idx="0">
+            <a:schemeClr val="accent1"/>
+          </a:effectRef>
+          <a:fontRef idx="minor">
+            <a:schemeClr val="lt1"/>
+          </a:fontRef>
+        </p:style>
+        <p:txBody>
+          <a:bodyPr rtlCol="0" anchor="ctr"/>
+          <a:lstStyle/>
+          <a:p>
+            <a:pPr algn="ctr"/>
+            <a:r>
+              <a:rPr lang="en-JP" dirty="0"/>
+              <a:t>Portrate</a:t>
+            </a:r>
+          </a:p>
+        </p:txBody>
+      </p:sp>
+      <p:sp>
+        <p:nvSpPr>
+          <p:cNvPr id="7" name="Rounded Rectangle 6">
+            <a:extLst>
+              <a:ext uri="{FF2B5EF4-FFF2-40B4-BE49-F238E27FC236}">
+                <a16:creationId xmlns:a16="http://schemas.microsoft.com/office/drawing/2014/main" id="{3E1D37A7-39E7-B64D-82B3-5F1EE3939C27}"/>
+              </a:ext>
+            </a:extLst>
+          </p:cNvPr>
+          <p:cNvSpPr/>
+          <p:nvPr/>
+        </p:nvSpPr>
+        <p:spPr>
+          <a:xfrm>
+            <a:off x="3389645" y="2382038"/>
+            <a:ext cx="6558223" cy="3084306"/>
+          </a:xfrm>
+          <a:prstGeom prst="roundRect">
+            <a:avLst/>
+          </a:prstGeom>
+        </p:spPr>
+        <p:style>
+          <a:lnRef idx="2">
+            <a:schemeClr val="accent1">
+              <a:shade val="50000"/>
+            </a:schemeClr>
+          </a:lnRef>
+          <a:fillRef idx="1">
+            <a:schemeClr val="accent1"/>
+          </a:fillRef>
+          <a:effectRef idx="0">
+            <a:schemeClr val="accent1"/>
+          </a:effectRef>
+          <a:fontRef idx="minor">
+            <a:schemeClr val="lt1"/>
+          </a:fontRef>
+        </p:style>
+        <p:txBody>
+          <a:bodyPr rtlCol="0" anchor="ctr"/>
+          <a:lstStyle/>
+          <a:p>
+            <a:pPr algn="ctr"/>
+            <a:r>
+              <a:rPr lang="en-JP" dirty="0"/>
+              <a:t>Landscape</a:t>
+            </a:r>
+          </a:p>
+        </p:txBody>
+      </p:sp>
+    </p:spTree>
+    <p:extLst>
+      <p:ext uri="{BB962C8B-B14F-4D97-AF65-F5344CB8AC3E}">
+        <p14:creationId xmlns:p14="http://schemas.microsoft.com/office/powerpoint/2010/main" val="2125633770"/>
+      </p:ext>
+    </p:extLst>
+  </p:cSld>
+  <p:clrMapOvr>
+    <a:masterClrMapping/>
+  </p:clrMapOvr>
+</p:sld>
+</file>
+
+<file path=ppt/slides/slide5.xml><?xml version="1.0" encoding="utf-8"?>
+<p:sld xmlns:a="http://schemas.openxmlformats.org/drawingml/2006/main" xmlns:r="http://schemas.openxmlformats.org/officeDocument/2006/relationships" xmlns:p="http://schemas.openxmlformats.org/presentationml/2006/main">
+  <p:cSld>
+    <p:spTree>
+      <p:nvGrpSpPr>
+        <p:cNvPr id="1" name=""/>
+        <p:cNvGrpSpPr/>
+        <p:nvPr/>
+      </p:nvGrpSpPr>
+      <p:grpSpPr>
+        <a:xfrm>
+          <a:off x="0" y="0"/>
+          <a:ext cx="0" cy="0"/>
+          <a:chOff x="0" y="0"/>
+          <a:chExt cx="0" cy="0"/>
+        </a:xfrm>
+      </p:grpSpPr>
+      <p:sp>
+        <p:nvSpPr>
+          <p:cNvPr id="2" name="Title 1">
+            <a:extLst>
+              <a:ext uri="{FF2B5EF4-FFF2-40B4-BE49-F238E27FC236}">
+                <a16:creationId xmlns:a16="http://schemas.microsoft.com/office/drawing/2014/main" id="{862A8143-C5BE-844C-A5AB-23B6C9BC6A6A}"/>
+              </a:ext>
+            </a:extLst>
+          </p:cNvPr>
+          <p:cNvSpPr>
+            <a:spLocks noGrp="1"/>
+          </p:cNvSpPr>
+          <p:nvPr>
+            <p:ph type="title"/>
+          </p:nvPr>
+        </p:nvSpPr>
+        <p:spPr/>
+        <p:txBody>
+          <a:bodyPr/>
+          <a:lstStyle/>
+          <a:p>
+            <a:r>
+              <a:rPr lang="en-US" cap="none" dirty="0"/>
+              <a:t>Brandish </a:t>
+            </a:r>
+            <a:r>
+              <a:rPr lang="ja-JP" altLang="en-US" cap="none"/>
+              <a:t>の売りとは？</a:t>
+            </a:r>
+            <a:endParaRPr lang="en-JP" cap="none" dirty="0"/>
+          </a:p>
+        </p:txBody>
+      </p:sp>
+      <p:sp>
+        <p:nvSpPr>
+          <p:cNvPr id="3" name="Content Placeholder 2">
+            <a:extLst>
+              <a:ext uri="{FF2B5EF4-FFF2-40B4-BE49-F238E27FC236}">
+                <a16:creationId xmlns:a16="http://schemas.microsoft.com/office/drawing/2014/main" id="{D2F772A8-1113-1946-9AAF-6F319DB506B2}"/>
+              </a:ext>
+            </a:extLst>
+          </p:cNvPr>
+          <p:cNvSpPr>
+            <a:spLocks noGrp="1"/>
+          </p:cNvSpPr>
+          <p:nvPr>
+            <p:ph idx="1"/>
+          </p:nvPr>
+        </p:nvSpPr>
+        <p:spPr>
+          <a:xfrm>
+            <a:off x="1451579" y="2015732"/>
+            <a:ext cx="9722188" cy="3450613"/>
+          </a:xfrm>
+        </p:spPr>
+        <p:txBody>
+          <a:bodyPr/>
+          <a:lstStyle/>
+          <a:p>
+            <a:r>
+              <a:rPr lang="en-US" b="1" dirty="0">
+                <a:solidFill>
+                  <a:srgbClr val="0070C0"/>
+                </a:solidFill>
+              </a:rPr>
+              <a:t>Third Person </a:t>
+            </a:r>
+            <a:r>
+              <a:rPr lang="ja-JP" altLang="en-US" b="1">
+                <a:solidFill>
+                  <a:srgbClr val="0070C0"/>
+                </a:solidFill>
+              </a:rPr>
+              <a:t>視点</a:t>
+            </a:r>
+            <a:r>
+              <a:rPr lang="ja-JP" altLang="en-US" b="1"/>
+              <a:t>でありながら、</a:t>
+            </a:r>
+            <a:br>
+              <a:rPr lang="en-US" altLang="ja-JP" b="1" dirty="0"/>
+            </a:br>
+            <a:r>
+              <a:rPr lang="ja-JP" altLang="en-US" b="1"/>
+              <a:t>まるで</a:t>
+            </a:r>
+            <a:r>
+              <a:rPr lang="ja-JP" altLang="en-US" b="1">
+                <a:solidFill>
+                  <a:srgbClr val="0070C0"/>
+                </a:solidFill>
+              </a:rPr>
+              <a:t>一人称</a:t>
+            </a:r>
+            <a:r>
+              <a:rPr lang="ja-JP" altLang="en-US" b="1"/>
+              <a:t>としてそこにいるかのような臨場感</a:t>
+            </a:r>
+          </a:p>
+          <a:p>
+            <a:r>
+              <a:rPr lang="ja-JP" altLang="en-US"/>
+              <a:t>タイルマップ移動方式の独特な操作感</a:t>
+            </a:r>
+          </a:p>
+          <a:p>
+            <a:r>
+              <a:rPr lang="ja-JP" altLang="en-US"/>
+              <a:t>ルールの決まった動きの中でのパズル・謎解き要素</a:t>
+            </a:r>
+            <a:endParaRPr lang="en-JP" dirty="0"/>
+          </a:p>
+        </p:txBody>
+      </p:sp>
+    </p:spTree>
+    <p:extLst>
+      <p:ext uri="{BB962C8B-B14F-4D97-AF65-F5344CB8AC3E}">
+        <p14:creationId xmlns:p14="http://schemas.microsoft.com/office/powerpoint/2010/main" val="4062444840"/>
+      </p:ext>
+    </p:extLst>
+  </p:cSld>
+  <p:clrMapOvr>
+    <a:masterClrMapping/>
+  </p:clrMapOvr>
+</p:sld>
+</file>
+
+<file path=ppt/slides/slide6.xml><?xml version="1.0" encoding="utf-8"?>
+<p:sld xmlns:a="http://schemas.openxmlformats.org/drawingml/2006/main" xmlns:r="http://schemas.openxmlformats.org/officeDocument/2006/relationships" xmlns:p="http://schemas.openxmlformats.org/presentationml/2006/main">
+  <p:cSld>
+    <p:spTree>
+      <p:nvGrpSpPr>
+        <p:cNvPr id="1" name=""/>
+        <p:cNvGrpSpPr/>
+        <p:nvPr/>
+      </p:nvGrpSpPr>
+      <p:grpSpPr>
+        <a:xfrm>
+          <a:off x="0" y="0"/>
+          <a:ext cx="0" cy="0"/>
+          <a:chOff x="0" y="0"/>
+          <a:chExt cx="0" cy="0"/>
+        </a:xfrm>
+      </p:grpSpPr>
+      <p:sp>
+        <p:nvSpPr>
+          <p:cNvPr id="2" name="Title 1">
+            <a:extLst>
+              <a:ext uri="{FF2B5EF4-FFF2-40B4-BE49-F238E27FC236}">
+                <a16:creationId xmlns:a16="http://schemas.microsoft.com/office/drawing/2014/main" id="{5ECB3343-EDB0-8340-ABE7-B0D849C3B4CE}"/>
+              </a:ext>
+            </a:extLst>
+          </p:cNvPr>
+          <p:cNvSpPr>
+            <a:spLocks noGrp="1"/>
+          </p:cNvSpPr>
+          <p:nvPr>
+            <p:ph type="title"/>
+          </p:nvPr>
+        </p:nvSpPr>
+        <p:spPr>
+          <a:xfrm>
+            <a:off x="1451579" y="734181"/>
+            <a:ext cx="10261034" cy="1049235"/>
+          </a:xfrm>
+        </p:spPr>
+        <p:txBody>
+          <a:bodyPr>
+            <a:noAutofit/>
+          </a:bodyPr>
+          <a:lstStyle/>
+          <a:p>
+            <a:r>
+              <a:rPr lang="en-US" sz="3600" b="1" cap="none" dirty="0">
+                <a:latin typeface="Yu Gothic" panose="020B0400000000000000" pitchFamily="34" charset="-128"/>
+                <a:ea typeface="Yu Gothic" panose="020B0400000000000000" pitchFamily="34" charset="-128"/>
+              </a:rPr>
+              <a:t>Third Person </a:t>
+            </a:r>
+            <a:r>
+              <a:rPr lang="ja-JP" altLang="en-US" sz="3600" b="1" cap="none">
+                <a:latin typeface="Yu Gothic" panose="020B0400000000000000" pitchFamily="34" charset="-128"/>
+                <a:ea typeface="Yu Gothic" panose="020B0400000000000000" pitchFamily="34" charset="-128"/>
+              </a:rPr>
+              <a:t>視点でありながら、</a:t>
+            </a:r>
+            <a:br>
+              <a:rPr lang="en-US" altLang="ja-JP" sz="3600" b="1" cap="none" dirty="0">
+                <a:latin typeface="Yu Gothic" panose="020B0400000000000000" pitchFamily="34" charset="-128"/>
+                <a:ea typeface="Yu Gothic" panose="020B0400000000000000" pitchFamily="34" charset="-128"/>
+              </a:rPr>
+            </a:br>
+            <a:r>
+              <a:rPr lang="ja-JP" altLang="en-US" sz="3600" b="1" cap="none">
+                <a:latin typeface="Yu Gothic" panose="020B0400000000000000" pitchFamily="34" charset="-128"/>
+                <a:ea typeface="Yu Gothic" panose="020B0400000000000000" pitchFamily="34" charset="-128"/>
+              </a:rPr>
+              <a:t>まるで一人称としてそこにいるかのような臨場感</a:t>
+            </a:r>
+            <a:endParaRPr lang="en-JP" sz="3600" b="1" cap="none" dirty="0">
+              <a:latin typeface="Yu Gothic" panose="020B0400000000000000" pitchFamily="34" charset="-128"/>
+              <a:ea typeface="Yu Gothic" panose="020B0400000000000000" pitchFamily="34" charset="-128"/>
+            </a:endParaRPr>
+          </a:p>
+        </p:txBody>
+      </p:sp>
+      <p:sp>
+        <p:nvSpPr>
+          <p:cNvPr id="3" name="Content Placeholder 2">
+            <a:extLst>
+              <a:ext uri="{FF2B5EF4-FFF2-40B4-BE49-F238E27FC236}">
+                <a16:creationId xmlns:a16="http://schemas.microsoft.com/office/drawing/2014/main" id="{B47DFD78-DCD5-6D4A-8D37-5D78924AF41F}"/>
+              </a:ext>
+            </a:extLst>
+          </p:cNvPr>
+          <p:cNvSpPr>
+            <a:spLocks noGrp="1"/>
+          </p:cNvSpPr>
+          <p:nvPr>
+            <p:ph idx="1"/>
+          </p:nvPr>
+        </p:nvSpPr>
+        <p:spPr/>
+        <p:txBody>
+          <a:bodyPr anchor="ctr"/>
+          <a:lstStyle/>
+          <a:p>
+            <a:pPr algn="ctr"/>
+            <a:r>
+              <a:rPr lang="en-JP" dirty="0"/>
+              <a:t>何がすごいのか？</a:t>
+            </a:r>
+          </a:p>
+        </p:txBody>
+      </p:sp>
+    </p:spTree>
+    <p:extLst>
+      <p:ext uri="{BB962C8B-B14F-4D97-AF65-F5344CB8AC3E}">
+        <p14:creationId xmlns:p14="http://schemas.microsoft.com/office/powerpoint/2010/main" val="2715575130"/>
+      </p:ext>
+    </p:extLst>
+  </p:cSld>
+  <p:clrMapOvr>
+    <a:masterClrMapping/>
+  </p:clrMapOvr>
+</p:sld>
+</file>
+
+<file path=ppt/slides/slide7.xml><?xml version="1.0" encoding="utf-8"?>
+<p:sld xmlns:a="http://schemas.openxmlformats.org/drawingml/2006/main" xmlns:r="http://schemas.openxmlformats.org/officeDocument/2006/relationships" xmlns:p="http://schemas.openxmlformats.org/presentationml/2006/main">
+  <p:cSld>
+    <p:spTree>
+      <p:nvGrpSpPr>
+        <p:cNvPr id="1" name=""/>
+        <p:cNvGrpSpPr/>
+        <p:nvPr/>
+      </p:nvGrpSpPr>
+      <p:grpSpPr>
+        <a:xfrm>
+          <a:off x="0" y="0"/>
+          <a:ext cx="0" cy="0"/>
+          <a:chOff x="0" y="0"/>
+          <a:chExt cx="0" cy="0"/>
+        </a:xfrm>
+      </p:grpSpPr>
+      <p:sp>
+        <p:nvSpPr>
+          <p:cNvPr id="2" name="Title 1">
+            <a:extLst>
+              <a:ext uri="{FF2B5EF4-FFF2-40B4-BE49-F238E27FC236}">
+                <a16:creationId xmlns:a16="http://schemas.microsoft.com/office/drawing/2014/main" id="{FE41283E-10C4-2C4A-A278-4B0E529F0508}"/>
+              </a:ext>
+            </a:extLst>
+          </p:cNvPr>
+          <p:cNvSpPr>
+            <a:spLocks noGrp="1"/>
+          </p:cNvSpPr>
+          <p:nvPr>
+            <p:ph type="title"/>
+          </p:nvPr>
+        </p:nvSpPr>
+        <p:spPr/>
+        <p:txBody>
+          <a:bodyPr/>
+          <a:lstStyle/>
+          <a:p>
+            <a:r>
+              <a:rPr lang="en-JP" cap="none" dirty="0">
+                <a:latin typeface="Yu Gothic" panose="020B0400000000000000" pitchFamily="34" charset="-128"/>
+                <a:ea typeface="Yu Gothic" panose="020B0400000000000000" pitchFamily="34" charset="-128"/>
+              </a:rPr>
+              <a:t>First Person 視点の良さ</a:t>
+            </a:r>
+          </a:p>
+        </p:txBody>
+      </p:sp>
+      <p:sp>
+        <p:nvSpPr>
+          <p:cNvPr id="3" name="Content Placeholder 2">
+            <a:extLst>
+              <a:ext uri="{FF2B5EF4-FFF2-40B4-BE49-F238E27FC236}">
+                <a16:creationId xmlns:a16="http://schemas.microsoft.com/office/drawing/2014/main" id="{65692BDB-BBCF-D04F-9D53-712FFEC8477E}"/>
+              </a:ext>
+            </a:extLst>
+          </p:cNvPr>
+          <p:cNvSpPr>
+            <a:spLocks noGrp="1"/>
+          </p:cNvSpPr>
+          <p:nvPr>
+            <p:ph idx="1"/>
+          </p:nvPr>
+        </p:nvSpPr>
+        <p:spPr/>
+        <p:txBody>
+          <a:bodyPr/>
+          <a:lstStyle/>
+          <a:p>
+            <a:endParaRPr lang="en-JP"/>
+          </a:p>
+        </p:txBody>
+      </p:sp>
+    </p:spTree>
+    <p:extLst>
+      <p:ext uri="{BB962C8B-B14F-4D97-AF65-F5344CB8AC3E}">
+        <p14:creationId xmlns:p14="http://schemas.microsoft.com/office/powerpoint/2010/main" val="2718208650"/>
+      </p:ext>
+    </p:extLst>
+  </p:cSld>
+  <p:clrMapOvr>
+    <a:masterClrMapping/>
+  </p:clrMapOvr>
+</p:sld>
+</file>
+
+<file path=ppt/slides/slide8.xml><?xml version="1.0" encoding="utf-8"?>
+<p:sld xmlns:a="http://schemas.openxmlformats.org/drawingml/2006/main" xmlns:r="http://schemas.openxmlformats.org/officeDocument/2006/relationships" xmlns:p="http://schemas.openxmlformats.org/presentationml/2006/main">
+  <p:cSld>
+    <p:spTree>
+      <p:nvGrpSpPr>
+        <p:cNvPr id="1" name=""/>
+        <p:cNvGrpSpPr/>
+        <p:nvPr/>
+      </p:nvGrpSpPr>
+      <p:grpSpPr>
+        <a:xfrm>
+          <a:off x="0" y="0"/>
+          <a:ext cx="0" cy="0"/>
+          <a:chOff x="0" y="0"/>
+          <a:chExt cx="0" cy="0"/>
+        </a:xfrm>
+      </p:grpSpPr>
+      <p:sp>
+        <p:nvSpPr>
+          <p:cNvPr id="3" name="Content Placeholder 2">
+            <a:extLst>
+              <a:ext uri="{FF2B5EF4-FFF2-40B4-BE49-F238E27FC236}">
+                <a16:creationId xmlns:a16="http://schemas.microsoft.com/office/drawing/2014/main" id="{91A5B00C-B2D0-7146-8FBA-A5DE2EFACD00}"/>
+              </a:ext>
+            </a:extLst>
+          </p:cNvPr>
+          <p:cNvSpPr>
+            <a:spLocks noGrp="1"/>
+          </p:cNvSpPr>
+          <p:nvPr>
+            <p:ph idx="1"/>
+          </p:nvPr>
+        </p:nvSpPr>
+        <p:spPr/>
+        <p:txBody>
+          <a:bodyPr/>
+          <a:lstStyle/>
+          <a:p>
+            <a:endParaRPr lang="en-JP"/>
+          </a:p>
+        </p:txBody>
+      </p:sp>
+      <p:sp>
+        <p:nvSpPr>
+          <p:cNvPr id="4" name="Title 1">
+            <a:extLst>
+              <a:ext uri="{FF2B5EF4-FFF2-40B4-BE49-F238E27FC236}">
+                <a16:creationId xmlns:a16="http://schemas.microsoft.com/office/drawing/2014/main" id="{FC9FB8C4-7A0B-A544-8184-B4238F2FCE9A}"/>
+              </a:ext>
+            </a:extLst>
+          </p:cNvPr>
+          <p:cNvSpPr>
+            <a:spLocks noGrp="1"/>
+          </p:cNvSpPr>
+          <p:nvPr>
+            <p:ph type="title"/>
+          </p:nvPr>
+        </p:nvSpPr>
+        <p:spPr/>
+        <p:txBody>
+          <a:bodyPr/>
+          <a:lstStyle/>
+          <a:p>
+            <a:r>
+              <a:rPr lang="en-JP" cap="none" dirty="0">
+                <a:latin typeface="Yu Gothic" panose="020B0400000000000000" pitchFamily="34" charset="-128"/>
+                <a:ea typeface="Yu Gothic" panose="020B0400000000000000" pitchFamily="34" charset="-128"/>
+              </a:rPr>
+              <a:t>First Person 視点の弱点</a:t>
+            </a:r>
+          </a:p>
+        </p:txBody>
+      </p:sp>
+    </p:spTree>
+    <p:extLst>
+      <p:ext uri="{BB962C8B-B14F-4D97-AF65-F5344CB8AC3E}">
+        <p14:creationId xmlns:p14="http://schemas.microsoft.com/office/powerpoint/2010/main" val="2215629917"/>
+      </p:ext>
+    </p:extLst>
+  </p:cSld>
+  <p:clrMapOvr>
+    <a:masterClrMapping/>
+  </p:clrMapOvr>
+</p:sld>
+</file>
+
+<file path=ppt/slides/slide9.xml><?xml version="1.0" encoding="utf-8"?>
+<p:sld xmlns:a="http://schemas.openxmlformats.org/drawingml/2006/main" xmlns:r="http://schemas.openxmlformats.org/officeDocument/2006/relationships" xmlns:p="http://schemas.openxmlformats.org/presentationml/2006/main">
+  <p:cSld>
+    <p:spTree>
+      <p:nvGrpSpPr>
+        <p:cNvPr id="1" name=""/>
+        <p:cNvGrpSpPr/>
+        <p:nvPr/>
+      </p:nvGrpSpPr>
+      <p:grpSpPr>
+        <a:xfrm>
+          <a:off x="0" y="0"/>
+          <a:ext cx="0" cy="0"/>
+          <a:chOff x="0" y="0"/>
+          <a:chExt cx="0" cy="0"/>
+        </a:xfrm>
+      </p:grpSpPr>
+      <p:sp>
+        <p:nvSpPr>
+          <p:cNvPr id="3" name="Content Placeholder 2">
+            <a:extLst>
+              <a:ext uri="{FF2B5EF4-FFF2-40B4-BE49-F238E27FC236}">
+                <a16:creationId xmlns:a16="http://schemas.microsoft.com/office/drawing/2014/main" id="{28214307-13DC-1D42-B137-0037B181FEEE}"/>
+              </a:ext>
+            </a:extLst>
+          </p:cNvPr>
+          <p:cNvSpPr>
+            <a:spLocks noGrp="1"/>
+          </p:cNvSpPr>
+          <p:nvPr>
+            <p:ph idx="1"/>
+          </p:nvPr>
+        </p:nvSpPr>
+        <p:spPr/>
+        <p:txBody>
+          <a:bodyPr/>
+          <a:lstStyle/>
+          <a:p>
+            <a:endParaRPr lang="en-JP"/>
+          </a:p>
+        </p:txBody>
+      </p:sp>
+      <p:sp>
+        <p:nvSpPr>
+          <p:cNvPr id="4" name="Title 1">
+            <a:extLst>
+              <a:ext uri="{FF2B5EF4-FFF2-40B4-BE49-F238E27FC236}">
+                <a16:creationId xmlns:a16="http://schemas.microsoft.com/office/drawing/2014/main" id="{15CC04E2-9B8C-5843-A923-B394EB9846B1}"/>
+              </a:ext>
+            </a:extLst>
+          </p:cNvPr>
+          <p:cNvSpPr>
+            <a:spLocks noGrp="1"/>
+          </p:cNvSpPr>
+          <p:nvPr>
+            <p:ph type="title"/>
+          </p:nvPr>
+        </p:nvSpPr>
+        <p:spPr/>
+        <p:txBody>
+          <a:bodyPr/>
+          <a:lstStyle/>
+          <a:p>
+            <a:r>
+              <a:rPr lang="ja-JP" altLang="en-US" cap="none"/>
+              <a:t>パズル的面白さの追求</a:t>
+            </a:r>
+            <a:r>
+              <a:rPr lang="en-US" altLang="ja-JP" cap="none" dirty="0"/>
+              <a:t>(</a:t>
+            </a:r>
+            <a:r>
+              <a:rPr lang="ja-JP" altLang="en-US" cap="none"/>
+              <a:t>の重要性</a:t>
+            </a:r>
+            <a:r>
+              <a:rPr lang="en-US" altLang="ja-JP" cap="none" dirty="0"/>
+              <a:t>)</a:t>
+            </a:r>
+            <a:endParaRPr lang="en-JP" cap="none" dirty="0"/>
+          </a:p>
+        </p:txBody>
+      </p:sp>
+    </p:spTree>
+    <p:extLst>
+      <p:ext uri="{BB962C8B-B14F-4D97-AF65-F5344CB8AC3E}">
+        <p14:creationId xmlns:p14="http://schemas.microsoft.com/office/powerpoint/2010/main" val="2851007069"/>
       </p:ext>
     </p:extLst>
   </p:cSld>

</xml_diff>

<commit_message>
Implement flick direction guide to door handling UI
</commit_message>
<xml_diff>
--- a/Docs/Proposal_v0.0.1.pptx
+++ b/Docs/Proposal_v0.0.1.pptx
@@ -8,17 +8,18 @@
     <p:sldId id="256" r:id="rId2"/>
     <p:sldId id="258" r:id="rId3"/>
     <p:sldId id="257" r:id="rId4"/>
-    <p:sldId id="259" r:id="rId5"/>
-    <p:sldId id="260" r:id="rId6"/>
-    <p:sldId id="261" r:id="rId7"/>
-    <p:sldId id="262" r:id="rId8"/>
-    <p:sldId id="263" r:id="rId9"/>
-    <p:sldId id="264" r:id="rId10"/>
-    <p:sldId id="265" r:id="rId11"/>
-    <p:sldId id="266" r:id="rId12"/>
-    <p:sldId id="267" r:id="rId13"/>
-    <p:sldId id="269" r:id="rId14"/>
-    <p:sldId id="268" r:id="rId15"/>
+    <p:sldId id="270" r:id="rId5"/>
+    <p:sldId id="259" r:id="rId6"/>
+    <p:sldId id="260" r:id="rId7"/>
+    <p:sldId id="261" r:id="rId8"/>
+    <p:sldId id="262" r:id="rId9"/>
+    <p:sldId id="263" r:id="rId10"/>
+    <p:sldId id="264" r:id="rId11"/>
+    <p:sldId id="265" r:id="rId12"/>
+    <p:sldId id="266" r:id="rId13"/>
+    <p:sldId id="267" r:id="rId14"/>
+    <p:sldId id="269" r:id="rId15"/>
+    <p:sldId id="268" r:id="rId16"/>
   </p:sldIdLst>
   <p:sldSz cx="12192000" cy="6858000"/>
   <p:notesSz cx="6858000" cy="9144000"/>
@@ -264,7 +265,7 @@
           <a:p>
             <a:fld id="{48A87A34-81AB-432B-8DAE-1953F412C126}" type="datetimeFigureOut">
               <a:rPr lang="en-US" dirty="0"/>
-              <a:t>6/8/21</a:t>
+              <a:t>6/18/21</a:t>
             </a:fld>
             <a:endParaRPr lang="en-US" dirty="0"/>
           </a:p>
@@ -470,7 +471,7 @@
           <a:p>
             <a:fld id="{48A87A34-81AB-432B-8DAE-1953F412C126}" type="datetimeFigureOut">
               <a:rPr lang="en-US" dirty="0"/>
-              <a:t>6/8/21</a:t>
+              <a:t>6/18/21</a:t>
             </a:fld>
             <a:endParaRPr lang="en-US" dirty="0"/>
           </a:p>
@@ -680,7 +681,7 @@
           <a:p>
             <a:fld id="{48A87A34-81AB-432B-8DAE-1953F412C126}" type="datetimeFigureOut">
               <a:rPr lang="en-US" dirty="0"/>
-              <a:t>6/8/21</a:t>
+              <a:t>6/18/21</a:t>
             </a:fld>
             <a:endParaRPr lang="en-US" dirty="0"/>
           </a:p>
@@ -876,7 +877,7 @@
           <a:p>
             <a:fld id="{48A87A34-81AB-432B-8DAE-1953F412C126}" type="datetimeFigureOut">
               <a:rPr lang="en-US" dirty="0"/>
-              <a:t>6/8/21</a:t>
+              <a:t>6/18/21</a:t>
             </a:fld>
             <a:endParaRPr lang="en-US" dirty="0"/>
           </a:p>
@@ -1150,7 +1151,7 @@
           <a:p>
             <a:fld id="{48A87A34-81AB-432B-8DAE-1953F412C126}" type="datetimeFigureOut">
               <a:rPr lang="en-US" dirty="0"/>
-              <a:t>6/8/21</a:t>
+              <a:t>6/18/21</a:t>
             </a:fld>
             <a:endParaRPr lang="en-US" dirty="0"/>
           </a:p>
@@ -1413,7 +1414,7 @@
           <a:p>
             <a:fld id="{48A87A34-81AB-432B-8DAE-1953F412C126}" type="datetimeFigureOut">
               <a:rPr lang="en-US" dirty="0"/>
-              <a:t>6/8/21</a:t>
+              <a:t>6/18/21</a:t>
             </a:fld>
             <a:endParaRPr lang="en-US" dirty="0"/>
           </a:p>
@@ -1824,7 +1825,7 @@
           <a:p>
             <a:fld id="{48A87A34-81AB-432B-8DAE-1953F412C126}" type="datetimeFigureOut">
               <a:rPr lang="en-US" dirty="0"/>
-              <a:t>6/8/21</a:t>
+              <a:t>6/18/21</a:t>
             </a:fld>
             <a:endParaRPr lang="en-US" dirty="0"/>
           </a:p>
@@ -1968,7 +1969,7 @@
           <a:p>
             <a:fld id="{48A87A34-81AB-432B-8DAE-1953F412C126}" type="datetimeFigureOut">
               <a:rPr lang="en-US" dirty="0"/>
-              <a:t>6/8/21</a:t>
+              <a:t>6/18/21</a:t>
             </a:fld>
             <a:endParaRPr lang="en-US" dirty="0"/>
           </a:p>
@@ -2089,7 +2090,7 @@
           <a:p>
             <a:fld id="{48A87A34-81AB-432B-8DAE-1953F412C126}" type="datetimeFigureOut">
               <a:rPr lang="en-US" dirty="0"/>
-              <a:t>6/8/21</a:t>
+              <a:t>6/18/21</a:t>
             </a:fld>
             <a:endParaRPr lang="en-US" dirty="0"/>
           </a:p>
@@ -2335,7 +2336,7 @@
           <a:p>
             <a:fld id="{48A87A34-81AB-432B-8DAE-1953F412C126}" type="datetimeFigureOut">
               <a:rPr lang="en-US" dirty="0"/>
-              <a:t>6/8/21</a:t>
+              <a:t>6/18/21</a:t>
             </a:fld>
             <a:endParaRPr lang="en-US" dirty="0"/>
           </a:p>
@@ -2776,7 +2777,7 @@
             <a:fld id="{48A87A34-81AB-432B-8DAE-1953F412C126}" type="datetimeFigureOut">
               <a:rPr lang="en-US" dirty="0"/>
               <a:pPr/>
-              <a:t>6/8/21</a:t>
+              <a:t>6/18/21</a:t>
             </a:fld>
             <a:endParaRPr lang="en-US" dirty="0"/>
           </a:p>
@@ -3099,7 +3100,7 @@
             <a:fld id="{48A87A34-81AB-432B-8DAE-1953F412C126}" type="datetimeFigureOut">
               <a:rPr lang="en-US" dirty="0"/>
               <a:pPr/>
-              <a:t>6/8/21</a:t>
+              <a:t>6/18/21</a:t>
             </a:fld>
             <a:endParaRPr lang="en-US" dirty="0"/>
           </a:p>
@@ -3722,10 +3723,10 @@
       </p:grpSpPr>
       <p:sp>
         <p:nvSpPr>
-          <p:cNvPr id="2" name="Title 1">
+          <p:cNvPr id="3" name="Content Placeholder 2">
             <a:extLst>
               <a:ext uri="{FF2B5EF4-FFF2-40B4-BE49-F238E27FC236}">
-                <a16:creationId xmlns:a16="http://schemas.microsoft.com/office/drawing/2014/main" id="{D726D3D6-4819-E849-A2C6-5A2B9C083A8F}"/>
+                <a16:creationId xmlns:a16="http://schemas.microsoft.com/office/drawing/2014/main" id="{28214307-13DC-1D42-B137-0037B181FEEE}"/>
               </a:ext>
             </a:extLst>
           </p:cNvPr>
@@ -3733,7 +3734,7 @@
             <a:spLocks noGrp="1"/>
           </p:cNvSpPr>
           <p:nvPr>
-            <p:ph type="title"/>
+            <p:ph idx="1"/>
           </p:nvPr>
         </p:nvSpPr>
         <p:spPr/>
@@ -3741,20 +3742,16 @@
           <a:bodyPr/>
           <a:lstStyle/>
           <a:p>
-            <a:r>
-              <a:rPr lang="ja-JP" altLang="en-US"/>
-              <a:t>どんなアイデアを導入したか？</a:t>
-            </a:r>
-            <a:endParaRPr lang="en-JP" dirty="0"/>
-          </a:p>
-        </p:txBody>
-      </p:sp>
-      <p:sp>
-        <p:nvSpPr>
-          <p:cNvPr id="3" name="Content Placeholder 2">
+            <a:endParaRPr lang="en-JP"/>
+          </a:p>
+        </p:txBody>
+      </p:sp>
+      <p:sp>
+        <p:nvSpPr>
+          <p:cNvPr id="4" name="Title 1">
             <a:extLst>
               <a:ext uri="{FF2B5EF4-FFF2-40B4-BE49-F238E27FC236}">
-                <a16:creationId xmlns:a16="http://schemas.microsoft.com/office/drawing/2014/main" id="{3148B329-5B24-E64A-A21C-28CC88B39E67}"/>
+                <a16:creationId xmlns:a16="http://schemas.microsoft.com/office/drawing/2014/main" id="{15CC04E2-9B8C-5843-A923-B394EB9846B1}"/>
               </a:ext>
             </a:extLst>
           </p:cNvPr>
@@ -3762,7 +3759,7 @@
             <a:spLocks noGrp="1"/>
           </p:cNvSpPr>
           <p:nvPr>
-            <p:ph idx="1"/>
+            <p:ph type="title"/>
           </p:nvPr>
         </p:nvSpPr>
         <p:spPr/>
@@ -3770,14 +3767,30 @@
           <a:bodyPr/>
           <a:lstStyle/>
           <a:p>
-            <a:endParaRPr lang="en-JP"/>
+            <a:r>
+              <a:rPr lang="ja-JP" altLang="en-US" cap="none"/>
+              <a:t>パズル的面白さの追求</a:t>
+            </a:r>
+            <a:r>
+              <a:rPr lang="en-US" altLang="ja-JP" cap="none" dirty="0"/>
+              <a:t>(</a:t>
+            </a:r>
+            <a:r>
+              <a:rPr lang="ja-JP" altLang="en-US" cap="none"/>
+              <a:t>の重要性</a:t>
+            </a:r>
+            <a:r>
+              <a:rPr lang="en-US" altLang="ja-JP" cap="none" dirty="0"/>
+              <a:t>)</a:t>
+            </a:r>
+            <a:endParaRPr lang="en-JP" cap="none" dirty="0"/>
           </a:p>
         </p:txBody>
       </p:sp>
     </p:spTree>
     <p:extLst>
       <p:ext uri="{BB962C8B-B14F-4D97-AF65-F5344CB8AC3E}">
-        <p14:creationId xmlns:p14="http://schemas.microsoft.com/office/powerpoint/2010/main" val="1165214894"/>
+        <p14:creationId xmlns:p14="http://schemas.microsoft.com/office/powerpoint/2010/main" val="2851007069"/>
       </p:ext>
     </p:extLst>
   </p:cSld>
@@ -3809,7 +3822,7 @@
           <p:cNvPr id="2" name="Title 1">
             <a:extLst>
               <a:ext uri="{FF2B5EF4-FFF2-40B4-BE49-F238E27FC236}">
-                <a16:creationId xmlns:a16="http://schemas.microsoft.com/office/drawing/2014/main" id="{04E45D64-BD70-F246-9532-CA2D9D96B21B}"/>
+                <a16:creationId xmlns:a16="http://schemas.microsoft.com/office/drawing/2014/main" id="{D726D3D6-4819-E849-A2C6-5A2B9C083A8F}"/>
               </a:ext>
             </a:extLst>
           </p:cNvPr>
@@ -3827,7 +3840,7 @@
           <a:p>
             <a:r>
               <a:rPr lang="ja-JP" altLang="en-US"/>
-              <a:t>制御フロー</a:t>
+              <a:t>どんなアイデアを導入したか？</a:t>
             </a:r>
             <a:endParaRPr lang="en-JP" dirty="0"/>
           </a:p>
@@ -3838,7 +3851,7 @@
           <p:cNvPr id="3" name="Content Placeholder 2">
             <a:extLst>
               <a:ext uri="{FF2B5EF4-FFF2-40B4-BE49-F238E27FC236}">
-                <a16:creationId xmlns:a16="http://schemas.microsoft.com/office/drawing/2014/main" id="{5C8C95B5-4038-D34D-9645-50613F27812C}"/>
+                <a16:creationId xmlns:a16="http://schemas.microsoft.com/office/drawing/2014/main" id="{3148B329-5B24-E64A-A21C-28CC88B39E67}"/>
               </a:ext>
             </a:extLst>
           </p:cNvPr>
@@ -3861,7 +3874,7 @@
     </p:spTree>
     <p:extLst>
       <p:ext uri="{BB962C8B-B14F-4D97-AF65-F5344CB8AC3E}">
-        <p14:creationId xmlns:p14="http://schemas.microsoft.com/office/powerpoint/2010/main" val="1480662988"/>
+        <p14:creationId xmlns:p14="http://schemas.microsoft.com/office/powerpoint/2010/main" val="1165214894"/>
       </p:ext>
     </p:extLst>
   </p:cSld>
@@ -3893,7 +3906,7 @@
           <p:cNvPr id="2" name="Title 1">
             <a:extLst>
               <a:ext uri="{FF2B5EF4-FFF2-40B4-BE49-F238E27FC236}">
-                <a16:creationId xmlns:a16="http://schemas.microsoft.com/office/drawing/2014/main" id="{178D8BD7-FAC0-B843-B26A-DDEB49CBFE00}"/>
+                <a16:creationId xmlns:a16="http://schemas.microsoft.com/office/drawing/2014/main" id="{04E45D64-BD70-F246-9532-CA2D9D96B21B}"/>
               </a:ext>
             </a:extLst>
           </p:cNvPr>
@@ -3911,7 +3924,7 @@
           <a:p>
             <a:r>
               <a:rPr lang="ja-JP" altLang="en-US"/>
-              <a:t>操作説明</a:t>
+              <a:t>制御フロー</a:t>
             </a:r>
             <a:endParaRPr lang="en-JP" dirty="0"/>
           </a:p>
@@ -3922,7 +3935,7 @@
           <p:cNvPr id="3" name="Content Placeholder 2">
             <a:extLst>
               <a:ext uri="{FF2B5EF4-FFF2-40B4-BE49-F238E27FC236}">
-                <a16:creationId xmlns:a16="http://schemas.microsoft.com/office/drawing/2014/main" id="{8C098A3B-3E09-914B-B732-BC7F91C3E872}"/>
+                <a16:creationId xmlns:a16="http://schemas.microsoft.com/office/drawing/2014/main" id="{5C8C95B5-4038-D34D-9645-50613F27812C}"/>
               </a:ext>
             </a:extLst>
           </p:cNvPr>
@@ -3938,14 +3951,14 @@
           <a:bodyPr/>
           <a:lstStyle/>
           <a:p>
-            <a:endParaRPr lang="en-JP" dirty="0"/>
+            <a:endParaRPr lang="en-JP"/>
           </a:p>
         </p:txBody>
       </p:sp>
     </p:spTree>
     <p:extLst>
       <p:ext uri="{BB962C8B-B14F-4D97-AF65-F5344CB8AC3E}">
-        <p14:creationId xmlns:p14="http://schemas.microsoft.com/office/powerpoint/2010/main" val="3288302659"/>
+        <p14:creationId xmlns:p14="http://schemas.microsoft.com/office/powerpoint/2010/main" val="1480662988"/>
       </p:ext>
     </p:extLst>
   </p:cSld>
@@ -3977,6 +3990,90 @@
           <p:cNvPr id="2" name="Title 1">
             <a:extLst>
               <a:ext uri="{FF2B5EF4-FFF2-40B4-BE49-F238E27FC236}">
+                <a16:creationId xmlns:a16="http://schemas.microsoft.com/office/drawing/2014/main" id="{178D8BD7-FAC0-B843-B26A-DDEB49CBFE00}"/>
+              </a:ext>
+            </a:extLst>
+          </p:cNvPr>
+          <p:cNvSpPr>
+            <a:spLocks noGrp="1"/>
+          </p:cNvSpPr>
+          <p:nvPr>
+            <p:ph type="title"/>
+          </p:nvPr>
+        </p:nvSpPr>
+        <p:spPr/>
+        <p:txBody>
+          <a:bodyPr/>
+          <a:lstStyle/>
+          <a:p>
+            <a:r>
+              <a:rPr lang="ja-JP" altLang="en-US"/>
+              <a:t>操作説明</a:t>
+            </a:r>
+            <a:endParaRPr lang="en-JP" dirty="0"/>
+          </a:p>
+        </p:txBody>
+      </p:sp>
+      <p:sp>
+        <p:nvSpPr>
+          <p:cNvPr id="3" name="Content Placeholder 2">
+            <a:extLst>
+              <a:ext uri="{FF2B5EF4-FFF2-40B4-BE49-F238E27FC236}">
+                <a16:creationId xmlns:a16="http://schemas.microsoft.com/office/drawing/2014/main" id="{8C098A3B-3E09-914B-B732-BC7F91C3E872}"/>
+              </a:ext>
+            </a:extLst>
+          </p:cNvPr>
+          <p:cNvSpPr>
+            <a:spLocks noGrp="1"/>
+          </p:cNvSpPr>
+          <p:nvPr>
+            <p:ph idx="1"/>
+          </p:nvPr>
+        </p:nvSpPr>
+        <p:spPr/>
+        <p:txBody>
+          <a:bodyPr/>
+          <a:lstStyle/>
+          <a:p>
+            <a:endParaRPr lang="en-JP" dirty="0"/>
+          </a:p>
+        </p:txBody>
+      </p:sp>
+    </p:spTree>
+    <p:extLst>
+      <p:ext uri="{BB962C8B-B14F-4D97-AF65-F5344CB8AC3E}">
+        <p14:creationId xmlns:p14="http://schemas.microsoft.com/office/powerpoint/2010/main" val="3288302659"/>
+      </p:ext>
+    </p:extLst>
+  </p:cSld>
+  <p:clrMapOvr>
+    <a:masterClrMapping/>
+  </p:clrMapOvr>
+</p:sld>
+</file>
+
+<file path=ppt/slides/slide14.xml><?xml version="1.0" encoding="utf-8"?>
+<p:sld xmlns:a="http://schemas.openxmlformats.org/drawingml/2006/main" xmlns:r="http://schemas.openxmlformats.org/officeDocument/2006/relationships" xmlns:p="http://schemas.openxmlformats.org/presentationml/2006/main">
+  <p:cSld>
+    <p:spTree>
+      <p:nvGrpSpPr>
+        <p:cNvPr id="1" name=""/>
+        <p:cNvGrpSpPr/>
+        <p:nvPr/>
+      </p:nvGrpSpPr>
+      <p:grpSpPr>
+        <a:xfrm>
+          <a:off x="0" y="0"/>
+          <a:ext cx="0" cy="0"/>
+          <a:chOff x="0" y="0"/>
+          <a:chExt cx="0" cy="0"/>
+        </a:xfrm>
+      </p:grpSpPr>
+      <p:sp>
+        <p:nvSpPr>
+          <p:cNvPr id="2" name="Title 1">
+            <a:extLst>
+              <a:ext uri="{FF2B5EF4-FFF2-40B4-BE49-F238E27FC236}">
                 <a16:creationId xmlns:a16="http://schemas.microsoft.com/office/drawing/2014/main" id="{C3A6B6C4-2EA8-7346-8B6C-A946AC3CD9DA}"/>
               </a:ext>
             </a:extLst>
@@ -4039,7 +4136,7 @@
 </p:sld>
 </file>
 
-<file path=ppt/slides/slide14.xml><?xml version="1.0" encoding="utf-8"?>
+<file path=ppt/slides/slide15.xml><?xml version="1.0" encoding="utf-8"?>
 <p:sld xmlns:a="http://schemas.openxmlformats.org/drawingml/2006/main" xmlns:r="http://schemas.openxmlformats.org/officeDocument/2006/relationships" xmlns:p="http://schemas.openxmlformats.org/presentationml/2006/main">
   <p:cSld>
     <p:spTree>
@@ -4201,10 +4298,6 @@
               <a:buNone/>
             </a:pPr>
             <a:r>
-              <a:rPr lang="en-JP" dirty="0"/>
-              <a:t>この世に</a:t>
-            </a:r>
-            <a:r>
               <a:rPr lang="en-JP" dirty="0">
                 <a:solidFill>
                   <a:srgbClr val="0070C0"/>
@@ -4222,11 +4315,11 @@
                   <a:srgbClr val="FF0000"/>
                 </a:solidFill>
               </a:rPr>
-              <a:t>あの怪作</a:t>
+              <a:t>あの挑戦的な名作</a:t>
             </a:r>
             <a:r>
               <a:rPr lang="en-JP" dirty="0"/>
-              <a:t>を</a:t>
+              <a:t>に</a:t>
             </a:r>
             <a:br>
               <a:rPr lang="en-JP" dirty="0"/>
@@ -4241,7 +4334,19 @@
             </a:r>
             <a:r>
               <a:rPr lang="en-JP" dirty="0"/>
-              <a:t>で現代によみがえらせる！！</a:t>
+              <a:t>で</a:t>
+            </a:r>
+            <a:r>
+              <a:rPr lang="en-JP" dirty="0">
+                <a:solidFill>
+                  <a:srgbClr val="FF0000"/>
+                </a:solidFill>
+              </a:rPr>
+              <a:t>再挑戦</a:t>
+            </a:r>
+            <a:r>
+              <a:rPr lang="en-JP" dirty="0"/>
+              <a:t>！！</a:t>
             </a:r>
           </a:p>
         </p:txBody>
@@ -4342,7 +4447,10 @@
           <a:bodyPr/>
           <a:lstStyle/>
           <a:p>
-            <a:endParaRPr lang="en-JP" dirty="0"/>
+            <a:r>
+              <a:rPr lang="en-JP" dirty="0"/>
+              <a:t>aa</a:t>
+            </a:r>
           </a:p>
         </p:txBody>
       </p:sp>
@@ -4482,6 +4590,733 @@
           </a:fontRef>
         </p:style>
       </p:cxnSp>
+      <p:sp>
+        <p:nvSpPr>
+          <p:cNvPr id="7" name="Content Placeholder 2">
+            <a:extLst>
+              <a:ext uri="{FF2B5EF4-FFF2-40B4-BE49-F238E27FC236}">
+                <a16:creationId xmlns:a16="http://schemas.microsoft.com/office/drawing/2014/main" id="{23EFAC83-E9E2-594B-8831-806DE89872CE}"/>
+              </a:ext>
+            </a:extLst>
+          </p:cNvPr>
+          <p:cNvSpPr txBox="1">
+            <a:spLocks/>
+          </p:cNvSpPr>
+          <p:nvPr/>
+        </p:nvSpPr>
+        <p:spPr>
+          <a:xfrm>
+            <a:off x="2836153" y="2006939"/>
+            <a:ext cx="2528834" cy="3450613"/>
+          </a:xfrm>
+          <a:prstGeom prst="rect">
+            <a:avLst/>
+          </a:prstGeom>
+        </p:spPr>
+        <p:txBody>
+          <a:bodyPr vert="horz" lIns="91440" tIns="45720" rIns="91440" bIns="45720" rtlCol="0" anchor="t">
+            <a:normAutofit/>
+          </a:bodyPr>
+          <a:lstStyle>
+            <a:lvl1pPr marL="228600" indent="-228600" algn="l" defTabSz="914400" rtl="0" eaLnBrk="1" latinLnBrk="0" hangingPunct="1">
+              <a:lnSpc>
+                <a:spcPct val="120000"/>
+              </a:lnSpc>
+              <a:spcBef>
+                <a:spcPts val="1000"/>
+              </a:spcBef>
+              <a:buClr>
+                <a:schemeClr val="accent1"/>
+              </a:buClr>
+              <a:buSzPct val="100000"/>
+              <a:buFont typeface="Arial" panose="020B0604020202020204" pitchFamily="34" charset="0"/>
+              <a:buChar char="•"/>
+              <a:defRPr sz="2000" kern="1200">
+                <a:solidFill>
+                  <a:schemeClr val="tx1"/>
+                </a:solidFill>
+                <a:effectLst/>
+                <a:latin typeface="+mn-lt"/>
+                <a:ea typeface="+mn-ea"/>
+                <a:cs typeface="+mn-cs"/>
+              </a:defRPr>
+            </a:lvl1pPr>
+            <a:lvl2pPr marL="685800" indent="-228600" algn="l" defTabSz="914400" rtl="0" eaLnBrk="1" latinLnBrk="0" hangingPunct="1">
+              <a:lnSpc>
+                <a:spcPct val="120000"/>
+              </a:lnSpc>
+              <a:spcBef>
+                <a:spcPts val="500"/>
+              </a:spcBef>
+              <a:buClr>
+                <a:schemeClr val="accent1"/>
+              </a:buClr>
+              <a:buSzPct val="100000"/>
+              <a:buFont typeface="Arial" panose="020B0604020202020204" pitchFamily="34" charset="0"/>
+              <a:buChar char="•"/>
+              <a:defRPr sz="1800" kern="1200" cap="none" baseline="0">
+                <a:solidFill>
+                  <a:schemeClr val="tx1"/>
+                </a:solidFill>
+                <a:effectLst/>
+                <a:latin typeface="+mn-lt"/>
+                <a:ea typeface="+mn-ea"/>
+                <a:cs typeface="+mn-cs"/>
+              </a:defRPr>
+            </a:lvl2pPr>
+            <a:lvl3pPr marL="1143000" indent="-228600" algn="l" defTabSz="914400" rtl="0" eaLnBrk="1" latinLnBrk="0" hangingPunct="1">
+              <a:lnSpc>
+                <a:spcPct val="120000"/>
+              </a:lnSpc>
+              <a:spcBef>
+                <a:spcPts val="500"/>
+              </a:spcBef>
+              <a:buClr>
+                <a:schemeClr val="accent1"/>
+              </a:buClr>
+              <a:buSzPct val="100000"/>
+              <a:buFont typeface="Arial" panose="020B0604020202020204" pitchFamily="34" charset="0"/>
+              <a:buChar char="•"/>
+              <a:defRPr sz="1600" kern="1200">
+                <a:solidFill>
+                  <a:schemeClr val="tx1"/>
+                </a:solidFill>
+                <a:effectLst/>
+                <a:latin typeface="+mn-lt"/>
+                <a:ea typeface="+mn-ea"/>
+                <a:cs typeface="+mn-cs"/>
+              </a:defRPr>
+            </a:lvl3pPr>
+            <a:lvl4pPr marL="1600200" indent="-228600" algn="l" defTabSz="914400" rtl="0" eaLnBrk="1" latinLnBrk="0" hangingPunct="1">
+              <a:lnSpc>
+                <a:spcPct val="120000"/>
+              </a:lnSpc>
+              <a:spcBef>
+                <a:spcPts val="500"/>
+              </a:spcBef>
+              <a:buClr>
+                <a:schemeClr val="accent1"/>
+              </a:buClr>
+              <a:buSzPct val="100000"/>
+              <a:buFont typeface="Arial" panose="020B0604020202020204" pitchFamily="34" charset="0"/>
+              <a:buChar char="•"/>
+              <a:defRPr sz="1400" kern="1200" cap="none" baseline="0">
+                <a:solidFill>
+                  <a:schemeClr val="tx1"/>
+                </a:solidFill>
+                <a:effectLst/>
+                <a:latin typeface="+mn-lt"/>
+                <a:ea typeface="+mn-ea"/>
+                <a:cs typeface="+mn-cs"/>
+              </a:defRPr>
+            </a:lvl4pPr>
+            <a:lvl5pPr marL="2057400" indent="-228600" algn="l" defTabSz="914400" rtl="0" eaLnBrk="1" latinLnBrk="0" hangingPunct="1">
+              <a:lnSpc>
+                <a:spcPct val="120000"/>
+              </a:lnSpc>
+              <a:spcBef>
+                <a:spcPts val="500"/>
+              </a:spcBef>
+              <a:buClr>
+                <a:schemeClr val="accent1"/>
+              </a:buClr>
+              <a:buSzPct val="100000"/>
+              <a:buFont typeface="Arial" panose="020B0604020202020204" pitchFamily="34" charset="0"/>
+              <a:buChar char="•"/>
+              <a:defRPr sz="1200" kern="1200">
+                <a:solidFill>
+                  <a:schemeClr val="tx1"/>
+                </a:solidFill>
+                <a:effectLst/>
+                <a:latin typeface="+mn-lt"/>
+                <a:ea typeface="+mn-ea"/>
+                <a:cs typeface="+mn-cs"/>
+              </a:defRPr>
+            </a:lvl5pPr>
+            <a:lvl6pPr marL="2514600" indent="-228600" algn="l" defTabSz="914400" rtl="0" eaLnBrk="1" latinLnBrk="0" hangingPunct="1">
+              <a:lnSpc>
+                <a:spcPct val="120000"/>
+              </a:lnSpc>
+              <a:spcBef>
+                <a:spcPts val="500"/>
+              </a:spcBef>
+              <a:buClr>
+                <a:schemeClr val="accent1"/>
+              </a:buClr>
+              <a:buSzPct val="100000"/>
+              <a:buFont typeface="Arial" panose="020B0604020202020204" pitchFamily="34" charset="0"/>
+              <a:buChar char="•"/>
+              <a:defRPr sz="1200" kern="1200">
+                <a:solidFill>
+                  <a:schemeClr val="tx1"/>
+                </a:solidFill>
+                <a:effectLst/>
+                <a:latin typeface="+mn-lt"/>
+                <a:ea typeface="+mn-ea"/>
+                <a:cs typeface="+mn-cs"/>
+              </a:defRPr>
+            </a:lvl6pPr>
+            <a:lvl7pPr marL="2971800" indent="-228600" algn="l" defTabSz="914400" rtl="0" eaLnBrk="1" latinLnBrk="0" hangingPunct="1">
+              <a:lnSpc>
+                <a:spcPct val="120000"/>
+              </a:lnSpc>
+              <a:spcBef>
+                <a:spcPts val="500"/>
+              </a:spcBef>
+              <a:buClr>
+                <a:schemeClr val="accent1"/>
+              </a:buClr>
+              <a:buSzPct val="100000"/>
+              <a:buFont typeface="Arial" panose="020B0604020202020204" pitchFamily="34" charset="0"/>
+              <a:buChar char="•"/>
+              <a:defRPr sz="1200" kern="1200">
+                <a:solidFill>
+                  <a:schemeClr val="tx1"/>
+                </a:solidFill>
+                <a:effectLst/>
+                <a:latin typeface="+mn-lt"/>
+                <a:ea typeface="+mn-ea"/>
+                <a:cs typeface="+mn-cs"/>
+              </a:defRPr>
+            </a:lvl7pPr>
+            <a:lvl8pPr marL="3429000" indent="-228600" algn="l" defTabSz="914400" rtl="0" eaLnBrk="1" latinLnBrk="0" hangingPunct="1">
+              <a:lnSpc>
+                <a:spcPct val="120000"/>
+              </a:lnSpc>
+              <a:spcBef>
+                <a:spcPts val="500"/>
+              </a:spcBef>
+              <a:buClr>
+                <a:schemeClr val="accent1"/>
+              </a:buClr>
+              <a:buSzPct val="100000"/>
+              <a:buFont typeface="Arial" panose="020B0604020202020204" pitchFamily="34" charset="0"/>
+              <a:buChar char="•"/>
+              <a:defRPr sz="1200" kern="1200" baseline="0">
+                <a:solidFill>
+                  <a:schemeClr val="tx1"/>
+                </a:solidFill>
+                <a:effectLst/>
+                <a:latin typeface="+mn-lt"/>
+                <a:ea typeface="+mn-ea"/>
+                <a:cs typeface="+mn-cs"/>
+              </a:defRPr>
+            </a:lvl8pPr>
+            <a:lvl9pPr marL="3886200" indent="-228600" algn="l" defTabSz="914400" rtl="0" eaLnBrk="1" latinLnBrk="0" hangingPunct="1">
+              <a:lnSpc>
+                <a:spcPct val="120000"/>
+              </a:lnSpc>
+              <a:spcBef>
+                <a:spcPts val="500"/>
+              </a:spcBef>
+              <a:buClr>
+                <a:schemeClr val="accent1"/>
+              </a:buClr>
+              <a:buSzPct val="100000"/>
+              <a:buFont typeface="Arial" panose="020B0604020202020204" pitchFamily="34" charset="0"/>
+              <a:buChar char="•"/>
+              <a:defRPr sz="1200" kern="1200" baseline="0">
+                <a:solidFill>
+                  <a:schemeClr val="tx1"/>
+                </a:solidFill>
+                <a:effectLst/>
+                <a:latin typeface="+mn-lt"/>
+                <a:ea typeface="+mn-ea"/>
+                <a:cs typeface="+mn-cs"/>
+              </a:defRPr>
+            </a:lvl9pPr>
+          </a:lstStyle>
+          <a:p>
+            <a:endParaRPr lang="en-JP" dirty="0"/>
+          </a:p>
+        </p:txBody>
+      </p:sp>
+      <p:sp>
+        <p:nvSpPr>
+          <p:cNvPr id="8" name="Content Placeholder 2">
+            <a:extLst>
+              <a:ext uri="{FF2B5EF4-FFF2-40B4-BE49-F238E27FC236}">
+                <a16:creationId xmlns:a16="http://schemas.microsoft.com/office/drawing/2014/main" id="{36A03C59-2CBB-C449-958E-C85CF06E6383}"/>
+              </a:ext>
+            </a:extLst>
+          </p:cNvPr>
+          <p:cNvSpPr txBox="1">
+            <a:spLocks/>
+          </p:cNvSpPr>
+          <p:nvPr/>
+        </p:nvSpPr>
+        <p:spPr>
+          <a:xfrm>
+            <a:off x="8359268" y="1998146"/>
+            <a:ext cx="2528834" cy="3450613"/>
+          </a:xfrm>
+          <a:prstGeom prst="rect">
+            <a:avLst/>
+          </a:prstGeom>
+        </p:spPr>
+        <p:txBody>
+          <a:bodyPr vert="horz" lIns="91440" tIns="45720" rIns="91440" bIns="45720" rtlCol="0" anchor="t">
+            <a:normAutofit/>
+          </a:bodyPr>
+          <a:lstStyle>
+            <a:lvl1pPr marL="228600" indent="-228600" algn="l" defTabSz="914400" rtl="0" eaLnBrk="1" latinLnBrk="0" hangingPunct="1">
+              <a:lnSpc>
+                <a:spcPct val="120000"/>
+              </a:lnSpc>
+              <a:spcBef>
+                <a:spcPts val="1000"/>
+              </a:spcBef>
+              <a:buClr>
+                <a:schemeClr val="accent1"/>
+              </a:buClr>
+              <a:buSzPct val="100000"/>
+              <a:buFont typeface="Arial" panose="020B0604020202020204" pitchFamily="34" charset="0"/>
+              <a:buChar char="•"/>
+              <a:defRPr sz="2000" kern="1200">
+                <a:solidFill>
+                  <a:schemeClr val="tx1"/>
+                </a:solidFill>
+                <a:effectLst/>
+                <a:latin typeface="+mn-lt"/>
+                <a:ea typeface="+mn-ea"/>
+                <a:cs typeface="+mn-cs"/>
+              </a:defRPr>
+            </a:lvl1pPr>
+            <a:lvl2pPr marL="685800" indent="-228600" algn="l" defTabSz="914400" rtl="0" eaLnBrk="1" latinLnBrk="0" hangingPunct="1">
+              <a:lnSpc>
+                <a:spcPct val="120000"/>
+              </a:lnSpc>
+              <a:spcBef>
+                <a:spcPts val="500"/>
+              </a:spcBef>
+              <a:buClr>
+                <a:schemeClr val="accent1"/>
+              </a:buClr>
+              <a:buSzPct val="100000"/>
+              <a:buFont typeface="Arial" panose="020B0604020202020204" pitchFamily="34" charset="0"/>
+              <a:buChar char="•"/>
+              <a:defRPr sz="1800" kern="1200" cap="none" baseline="0">
+                <a:solidFill>
+                  <a:schemeClr val="tx1"/>
+                </a:solidFill>
+                <a:effectLst/>
+                <a:latin typeface="+mn-lt"/>
+                <a:ea typeface="+mn-ea"/>
+                <a:cs typeface="+mn-cs"/>
+              </a:defRPr>
+            </a:lvl2pPr>
+            <a:lvl3pPr marL="1143000" indent="-228600" algn="l" defTabSz="914400" rtl="0" eaLnBrk="1" latinLnBrk="0" hangingPunct="1">
+              <a:lnSpc>
+                <a:spcPct val="120000"/>
+              </a:lnSpc>
+              <a:spcBef>
+                <a:spcPts val="500"/>
+              </a:spcBef>
+              <a:buClr>
+                <a:schemeClr val="accent1"/>
+              </a:buClr>
+              <a:buSzPct val="100000"/>
+              <a:buFont typeface="Arial" panose="020B0604020202020204" pitchFamily="34" charset="0"/>
+              <a:buChar char="•"/>
+              <a:defRPr sz="1600" kern="1200">
+                <a:solidFill>
+                  <a:schemeClr val="tx1"/>
+                </a:solidFill>
+                <a:effectLst/>
+                <a:latin typeface="+mn-lt"/>
+                <a:ea typeface="+mn-ea"/>
+                <a:cs typeface="+mn-cs"/>
+              </a:defRPr>
+            </a:lvl3pPr>
+            <a:lvl4pPr marL="1600200" indent="-228600" algn="l" defTabSz="914400" rtl="0" eaLnBrk="1" latinLnBrk="0" hangingPunct="1">
+              <a:lnSpc>
+                <a:spcPct val="120000"/>
+              </a:lnSpc>
+              <a:spcBef>
+                <a:spcPts val="500"/>
+              </a:spcBef>
+              <a:buClr>
+                <a:schemeClr val="accent1"/>
+              </a:buClr>
+              <a:buSzPct val="100000"/>
+              <a:buFont typeface="Arial" panose="020B0604020202020204" pitchFamily="34" charset="0"/>
+              <a:buChar char="•"/>
+              <a:defRPr sz="1400" kern="1200" cap="none" baseline="0">
+                <a:solidFill>
+                  <a:schemeClr val="tx1"/>
+                </a:solidFill>
+                <a:effectLst/>
+                <a:latin typeface="+mn-lt"/>
+                <a:ea typeface="+mn-ea"/>
+                <a:cs typeface="+mn-cs"/>
+              </a:defRPr>
+            </a:lvl4pPr>
+            <a:lvl5pPr marL="2057400" indent="-228600" algn="l" defTabSz="914400" rtl="0" eaLnBrk="1" latinLnBrk="0" hangingPunct="1">
+              <a:lnSpc>
+                <a:spcPct val="120000"/>
+              </a:lnSpc>
+              <a:spcBef>
+                <a:spcPts val="500"/>
+              </a:spcBef>
+              <a:buClr>
+                <a:schemeClr val="accent1"/>
+              </a:buClr>
+              <a:buSzPct val="100000"/>
+              <a:buFont typeface="Arial" panose="020B0604020202020204" pitchFamily="34" charset="0"/>
+              <a:buChar char="•"/>
+              <a:defRPr sz="1200" kern="1200">
+                <a:solidFill>
+                  <a:schemeClr val="tx1"/>
+                </a:solidFill>
+                <a:effectLst/>
+                <a:latin typeface="+mn-lt"/>
+                <a:ea typeface="+mn-ea"/>
+                <a:cs typeface="+mn-cs"/>
+              </a:defRPr>
+            </a:lvl5pPr>
+            <a:lvl6pPr marL="2514600" indent="-228600" algn="l" defTabSz="914400" rtl="0" eaLnBrk="1" latinLnBrk="0" hangingPunct="1">
+              <a:lnSpc>
+                <a:spcPct val="120000"/>
+              </a:lnSpc>
+              <a:spcBef>
+                <a:spcPts val="500"/>
+              </a:spcBef>
+              <a:buClr>
+                <a:schemeClr val="accent1"/>
+              </a:buClr>
+              <a:buSzPct val="100000"/>
+              <a:buFont typeface="Arial" panose="020B0604020202020204" pitchFamily="34" charset="0"/>
+              <a:buChar char="•"/>
+              <a:defRPr sz="1200" kern="1200">
+                <a:solidFill>
+                  <a:schemeClr val="tx1"/>
+                </a:solidFill>
+                <a:effectLst/>
+                <a:latin typeface="+mn-lt"/>
+                <a:ea typeface="+mn-ea"/>
+                <a:cs typeface="+mn-cs"/>
+              </a:defRPr>
+            </a:lvl6pPr>
+            <a:lvl7pPr marL="2971800" indent="-228600" algn="l" defTabSz="914400" rtl="0" eaLnBrk="1" latinLnBrk="0" hangingPunct="1">
+              <a:lnSpc>
+                <a:spcPct val="120000"/>
+              </a:lnSpc>
+              <a:spcBef>
+                <a:spcPts val="500"/>
+              </a:spcBef>
+              <a:buClr>
+                <a:schemeClr val="accent1"/>
+              </a:buClr>
+              <a:buSzPct val="100000"/>
+              <a:buFont typeface="Arial" panose="020B0604020202020204" pitchFamily="34" charset="0"/>
+              <a:buChar char="•"/>
+              <a:defRPr sz="1200" kern="1200">
+                <a:solidFill>
+                  <a:schemeClr val="tx1"/>
+                </a:solidFill>
+                <a:effectLst/>
+                <a:latin typeface="+mn-lt"/>
+                <a:ea typeface="+mn-ea"/>
+                <a:cs typeface="+mn-cs"/>
+              </a:defRPr>
+            </a:lvl7pPr>
+            <a:lvl8pPr marL="3429000" indent="-228600" algn="l" defTabSz="914400" rtl="0" eaLnBrk="1" latinLnBrk="0" hangingPunct="1">
+              <a:lnSpc>
+                <a:spcPct val="120000"/>
+              </a:lnSpc>
+              <a:spcBef>
+                <a:spcPts val="500"/>
+              </a:spcBef>
+              <a:buClr>
+                <a:schemeClr val="accent1"/>
+              </a:buClr>
+              <a:buSzPct val="100000"/>
+              <a:buFont typeface="Arial" panose="020B0604020202020204" pitchFamily="34" charset="0"/>
+              <a:buChar char="•"/>
+              <a:defRPr sz="1200" kern="1200" baseline="0">
+                <a:solidFill>
+                  <a:schemeClr val="tx1"/>
+                </a:solidFill>
+                <a:effectLst/>
+                <a:latin typeface="+mn-lt"/>
+                <a:ea typeface="+mn-ea"/>
+                <a:cs typeface="+mn-cs"/>
+              </a:defRPr>
+            </a:lvl8pPr>
+            <a:lvl9pPr marL="3886200" indent="-228600" algn="l" defTabSz="914400" rtl="0" eaLnBrk="1" latinLnBrk="0" hangingPunct="1">
+              <a:lnSpc>
+                <a:spcPct val="120000"/>
+              </a:lnSpc>
+              <a:spcBef>
+                <a:spcPts val="500"/>
+              </a:spcBef>
+              <a:buClr>
+                <a:schemeClr val="accent1"/>
+              </a:buClr>
+              <a:buSzPct val="100000"/>
+              <a:buFont typeface="Arial" panose="020B0604020202020204" pitchFamily="34" charset="0"/>
+              <a:buChar char="•"/>
+              <a:defRPr sz="1200" kern="1200" baseline="0">
+                <a:solidFill>
+                  <a:schemeClr val="tx1"/>
+                </a:solidFill>
+                <a:effectLst/>
+                <a:latin typeface="+mn-lt"/>
+                <a:ea typeface="+mn-ea"/>
+                <a:cs typeface="+mn-cs"/>
+              </a:defRPr>
+            </a:lvl9pPr>
+          </a:lstStyle>
+          <a:p>
+            <a:endParaRPr lang="en-JP" dirty="0"/>
+          </a:p>
+        </p:txBody>
+      </p:sp>
+      <p:sp>
+        <p:nvSpPr>
+          <p:cNvPr id="10" name="Content Placeholder 2">
+            <a:extLst>
+              <a:ext uri="{FF2B5EF4-FFF2-40B4-BE49-F238E27FC236}">
+                <a16:creationId xmlns:a16="http://schemas.microsoft.com/office/drawing/2014/main" id="{FB2B0613-F876-9C44-B531-F26F0066AE0D}"/>
+              </a:ext>
+            </a:extLst>
+          </p:cNvPr>
+          <p:cNvSpPr txBox="1">
+            <a:spLocks/>
+          </p:cNvSpPr>
+          <p:nvPr/>
+        </p:nvSpPr>
+        <p:spPr>
+          <a:xfrm>
+            <a:off x="8359268" y="1998145"/>
+            <a:ext cx="2528834" cy="3450613"/>
+          </a:xfrm>
+          <a:prstGeom prst="rect">
+            <a:avLst/>
+          </a:prstGeom>
+        </p:spPr>
+        <p:txBody>
+          <a:bodyPr vert="horz" lIns="91440" tIns="45720" rIns="91440" bIns="45720" rtlCol="0" anchor="t">
+            <a:normAutofit/>
+          </a:bodyPr>
+          <a:lstStyle>
+            <a:lvl1pPr marL="228600" indent="-228600" algn="l" defTabSz="914400" rtl="0" eaLnBrk="1" latinLnBrk="0" hangingPunct="1">
+              <a:lnSpc>
+                <a:spcPct val="120000"/>
+              </a:lnSpc>
+              <a:spcBef>
+                <a:spcPts val="1000"/>
+              </a:spcBef>
+              <a:buClr>
+                <a:schemeClr val="accent1"/>
+              </a:buClr>
+              <a:buSzPct val="100000"/>
+              <a:buFont typeface="Arial" panose="020B0604020202020204" pitchFamily="34" charset="0"/>
+              <a:buChar char="•"/>
+              <a:defRPr sz="2000" kern="1200">
+                <a:solidFill>
+                  <a:schemeClr val="tx1"/>
+                </a:solidFill>
+                <a:effectLst/>
+                <a:latin typeface="+mn-lt"/>
+                <a:ea typeface="+mn-ea"/>
+                <a:cs typeface="+mn-cs"/>
+              </a:defRPr>
+            </a:lvl1pPr>
+            <a:lvl2pPr marL="685800" indent="-228600" algn="l" defTabSz="914400" rtl="0" eaLnBrk="1" latinLnBrk="0" hangingPunct="1">
+              <a:lnSpc>
+                <a:spcPct val="120000"/>
+              </a:lnSpc>
+              <a:spcBef>
+                <a:spcPts val="500"/>
+              </a:spcBef>
+              <a:buClr>
+                <a:schemeClr val="accent1"/>
+              </a:buClr>
+              <a:buSzPct val="100000"/>
+              <a:buFont typeface="Arial" panose="020B0604020202020204" pitchFamily="34" charset="0"/>
+              <a:buChar char="•"/>
+              <a:defRPr sz="1800" kern="1200" cap="none" baseline="0">
+                <a:solidFill>
+                  <a:schemeClr val="tx1"/>
+                </a:solidFill>
+                <a:effectLst/>
+                <a:latin typeface="+mn-lt"/>
+                <a:ea typeface="+mn-ea"/>
+                <a:cs typeface="+mn-cs"/>
+              </a:defRPr>
+            </a:lvl2pPr>
+            <a:lvl3pPr marL="1143000" indent="-228600" algn="l" defTabSz="914400" rtl="0" eaLnBrk="1" latinLnBrk="0" hangingPunct="1">
+              <a:lnSpc>
+                <a:spcPct val="120000"/>
+              </a:lnSpc>
+              <a:spcBef>
+                <a:spcPts val="500"/>
+              </a:spcBef>
+              <a:buClr>
+                <a:schemeClr val="accent1"/>
+              </a:buClr>
+              <a:buSzPct val="100000"/>
+              <a:buFont typeface="Arial" panose="020B0604020202020204" pitchFamily="34" charset="0"/>
+              <a:buChar char="•"/>
+              <a:defRPr sz="1600" kern="1200">
+                <a:solidFill>
+                  <a:schemeClr val="tx1"/>
+                </a:solidFill>
+                <a:effectLst/>
+                <a:latin typeface="+mn-lt"/>
+                <a:ea typeface="+mn-ea"/>
+                <a:cs typeface="+mn-cs"/>
+              </a:defRPr>
+            </a:lvl3pPr>
+            <a:lvl4pPr marL="1600200" indent="-228600" algn="l" defTabSz="914400" rtl="0" eaLnBrk="1" latinLnBrk="0" hangingPunct="1">
+              <a:lnSpc>
+                <a:spcPct val="120000"/>
+              </a:lnSpc>
+              <a:spcBef>
+                <a:spcPts val="500"/>
+              </a:spcBef>
+              <a:buClr>
+                <a:schemeClr val="accent1"/>
+              </a:buClr>
+              <a:buSzPct val="100000"/>
+              <a:buFont typeface="Arial" panose="020B0604020202020204" pitchFamily="34" charset="0"/>
+              <a:buChar char="•"/>
+              <a:defRPr sz="1400" kern="1200" cap="none" baseline="0">
+                <a:solidFill>
+                  <a:schemeClr val="tx1"/>
+                </a:solidFill>
+                <a:effectLst/>
+                <a:latin typeface="+mn-lt"/>
+                <a:ea typeface="+mn-ea"/>
+                <a:cs typeface="+mn-cs"/>
+              </a:defRPr>
+            </a:lvl4pPr>
+            <a:lvl5pPr marL="2057400" indent="-228600" algn="l" defTabSz="914400" rtl="0" eaLnBrk="1" latinLnBrk="0" hangingPunct="1">
+              <a:lnSpc>
+                <a:spcPct val="120000"/>
+              </a:lnSpc>
+              <a:spcBef>
+                <a:spcPts val="500"/>
+              </a:spcBef>
+              <a:buClr>
+                <a:schemeClr val="accent1"/>
+              </a:buClr>
+              <a:buSzPct val="100000"/>
+              <a:buFont typeface="Arial" panose="020B0604020202020204" pitchFamily="34" charset="0"/>
+              <a:buChar char="•"/>
+              <a:defRPr sz="1200" kern="1200">
+                <a:solidFill>
+                  <a:schemeClr val="tx1"/>
+                </a:solidFill>
+                <a:effectLst/>
+                <a:latin typeface="+mn-lt"/>
+                <a:ea typeface="+mn-ea"/>
+                <a:cs typeface="+mn-cs"/>
+              </a:defRPr>
+            </a:lvl5pPr>
+            <a:lvl6pPr marL="2514600" indent="-228600" algn="l" defTabSz="914400" rtl="0" eaLnBrk="1" latinLnBrk="0" hangingPunct="1">
+              <a:lnSpc>
+                <a:spcPct val="120000"/>
+              </a:lnSpc>
+              <a:spcBef>
+                <a:spcPts val="500"/>
+              </a:spcBef>
+              <a:buClr>
+                <a:schemeClr val="accent1"/>
+              </a:buClr>
+              <a:buSzPct val="100000"/>
+              <a:buFont typeface="Arial" panose="020B0604020202020204" pitchFamily="34" charset="0"/>
+              <a:buChar char="•"/>
+              <a:defRPr sz="1200" kern="1200">
+                <a:solidFill>
+                  <a:schemeClr val="tx1"/>
+                </a:solidFill>
+                <a:effectLst/>
+                <a:latin typeface="+mn-lt"/>
+                <a:ea typeface="+mn-ea"/>
+                <a:cs typeface="+mn-cs"/>
+              </a:defRPr>
+            </a:lvl6pPr>
+            <a:lvl7pPr marL="2971800" indent="-228600" algn="l" defTabSz="914400" rtl="0" eaLnBrk="1" latinLnBrk="0" hangingPunct="1">
+              <a:lnSpc>
+                <a:spcPct val="120000"/>
+              </a:lnSpc>
+              <a:spcBef>
+                <a:spcPts val="500"/>
+              </a:spcBef>
+              <a:buClr>
+                <a:schemeClr val="accent1"/>
+              </a:buClr>
+              <a:buSzPct val="100000"/>
+              <a:buFont typeface="Arial" panose="020B0604020202020204" pitchFamily="34" charset="0"/>
+              <a:buChar char="•"/>
+              <a:defRPr sz="1200" kern="1200">
+                <a:solidFill>
+                  <a:schemeClr val="tx1"/>
+                </a:solidFill>
+                <a:effectLst/>
+                <a:latin typeface="+mn-lt"/>
+                <a:ea typeface="+mn-ea"/>
+                <a:cs typeface="+mn-cs"/>
+              </a:defRPr>
+            </a:lvl7pPr>
+            <a:lvl8pPr marL="3429000" indent="-228600" algn="l" defTabSz="914400" rtl="0" eaLnBrk="1" latinLnBrk="0" hangingPunct="1">
+              <a:lnSpc>
+                <a:spcPct val="120000"/>
+              </a:lnSpc>
+              <a:spcBef>
+                <a:spcPts val="500"/>
+              </a:spcBef>
+              <a:buClr>
+                <a:schemeClr val="accent1"/>
+              </a:buClr>
+              <a:buSzPct val="100000"/>
+              <a:buFont typeface="Arial" panose="020B0604020202020204" pitchFamily="34" charset="0"/>
+              <a:buChar char="•"/>
+              <a:defRPr sz="1200" kern="1200" baseline="0">
+                <a:solidFill>
+                  <a:schemeClr val="tx1"/>
+                </a:solidFill>
+                <a:effectLst/>
+                <a:latin typeface="+mn-lt"/>
+                <a:ea typeface="+mn-ea"/>
+                <a:cs typeface="+mn-cs"/>
+              </a:defRPr>
+            </a:lvl8pPr>
+            <a:lvl9pPr marL="3886200" indent="-228600" algn="l" defTabSz="914400" rtl="0" eaLnBrk="1" latinLnBrk="0" hangingPunct="1">
+              <a:lnSpc>
+                <a:spcPct val="120000"/>
+              </a:lnSpc>
+              <a:spcBef>
+                <a:spcPts val="500"/>
+              </a:spcBef>
+              <a:buClr>
+                <a:schemeClr val="accent1"/>
+              </a:buClr>
+              <a:buSzPct val="100000"/>
+              <a:buFont typeface="Arial" panose="020B0604020202020204" pitchFamily="34" charset="0"/>
+              <a:buChar char="•"/>
+              <a:defRPr sz="1200" kern="1200" baseline="0">
+                <a:solidFill>
+                  <a:schemeClr val="tx1"/>
+                </a:solidFill>
+                <a:effectLst/>
+                <a:latin typeface="+mn-lt"/>
+                <a:ea typeface="+mn-ea"/>
+                <a:cs typeface="+mn-cs"/>
+              </a:defRPr>
+            </a:lvl9pPr>
+          </a:lstStyle>
+          <a:p>
+            <a:r>
+              <a:rPr lang="en-JP"/>
+              <a:t>aa</a:t>
+            </a:r>
+            <a:endParaRPr lang="en-JP" dirty="0"/>
+          </a:p>
+        </p:txBody>
+      </p:sp>
     </p:spTree>
     <p:extLst>
       <p:ext uri="{BB962C8B-B14F-4D97-AF65-F5344CB8AC3E}">
@@ -4514,10 +5349,10 @@
       </p:grpSpPr>
       <p:sp>
         <p:nvSpPr>
-          <p:cNvPr id="2" name="Title 1">
+          <p:cNvPr id="3" name="Content Placeholder 2">
             <a:extLst>
               <a:ext uri="{FF2B5EF4-FFF2-40B4-BE49-F238E27FC236}">
-                <a16:creationId xmlns:a16="http://schemas.microsoft.com/office/drawing/2014/main" id="{AA686CA0-1EAB-524E-81EE-3AC308AA15EF}"/>
+                <a16:creationId xmlns:a16="http://schemas.microsoft.com/office/drawing/2014/main" id="{4069F896-2372-4A47-BD23-8E59D350AB42}"/>
               </a:ext>
             </a:extLst>
           </p:cNvPr>
@@ -4525,13 +5360,13 @@
             <a:spLocks noGrp="1"/>
           </p:cNvSpPr>
           <p:nvPr>
-            <p:ph type="title"/>
+            <p:ph idx="1"/>
           </p:nvPr>
         </p:nvSpPr>
         <p:spPr>
           <a:xfrm>
-            <a:off x="1451579" y="804519"/>
-            <a:ext cx="9603275" cy="1049235"/>
+            <a:off x="2823588" y="1998147"/>
+            <a:ext cx="2528834" cy="3450613"/>
           </a:xfrm>
         </p:spPr>
         <p:txBody>
@@ -4539,23 +5374,9 @@
           <a:lstStyle/>
           <a:p>
             <a:r>
-              <a:rPr lang="ja-JP" altLang="en-US">
-                <a:latin typeface="Yu Gothic" panose="020B0400000000000000" pitchFamily="34" charset="-128"/>
-                <a:ea typeface="Yu Gothic" panose="020B0400000000000000" pitchFamily="34" charset="-128"/>
-              </a:rPr>
-              <a:t>横画面</a:t>
-            </a:r>
-            <a:r>
-              <a:rPr lang="en-US" altLang="ja-JP" dirty="0">
-                <a:latin typeface="Yu Gothic" panose="020B0400000000000000" pitchFamily="34" charset="-128"/>
-                <a:ea typeface="Yu Gothic" panose="020B0400000000000000" pitchFamily="34" charset="-128"/>
-              </a:rPr>
-              <a:t> UI</a:t>
-            </a:r>
-            <a:endParaRPr lang="en-JP" dirty="0">
-              <a:latin typeface="Yu Gothic" panose="020B0400000000000000" pitchFamily="34" charset="-128"/>
-              <a:ea typeface="Yu Gothic" panose="020B0400000000000000" pitchFamily="34" charset="-128"/>
-            </a:endParaRPr>
+              <a:rPr lang="en-JP" dirty="0"/>
+              <a:t>aa</a:t>
+            </a:r>
           </a:p>
         </p:txBody>
       </p:sp>
@@ -4573,8 +5394,8 @@
         </p:nvSpPr>
         <p:spPr>
           <a:xfrm>
-            <a:off x="874208" y="3547067"/>
-            <a:ext cx="1075172" cy="1919277"/>
+            <a:off x="1874615" y="320422"/>
+            <a:ext cx="2888216" cy="5412468"/>
           </a:xfrm>
           <a:prstGeom prst="roundRect">
             <a:avLst/>
@@ -4603,17 +5424,17 @@
             <a:pPr algn="ctr"/>
             <a:r>
               <a:rPr lang="en-JP" dirty="0"/>
-              <a:t>Portrate</a:t>
-            </a:r>
-          </a:p>
-        </p:txBody>
-      </p:sp>
-      <p:sp>
-        <p:nvSpPr>
-          <p:cNvPr id="7" name="Rounded Rectangle 6">
+              <a:t>Moving image</a:t>
+            </a:r>
+          </a:p>
+        </p:txBody>
+      </p:sp>
+      <p:sp>
+        <p:nvSpPr>
+          <p:cNvPr id="15" name="Rounded Rectangle 14">
             <a:extLst>
               <a:ext uri="{FF2B5EF4-FFF2-40B4-BE49-F238E27FC236}">
-                <a16:creationId xmlns:a16="http://schemas.microsoft.com/office/drawing/2014/main" id="{3E1D37A7-39E7-B64D-82B3-5F1EE3939C27}"/>
+                <a16:creationId xmlns:a16="http://schemas.microsoft.com/office/drawing/2014/main" id="{1966BA71-2F1D-B14F-AF33-70FAD0DA8D31}"/>
               </a:ext>
             </a:extLst>
           </p:cNvPr>
@@ -4622,8 +5443,8 @@
         </p:nvSpPr>
         <p:spPr>
           <a:xfrm>
-            <a:off x="3389645" y="2382038"/>
-            <a:ext cx="6558223" cy="3084306"/>
+            <a:off x="6927725" y="320422"/>
+            <a:ext cx="2888215" cy="5412468"/>
           </a:xfrm>
           <a:prstGeom prst="roundRect">
             <a:avLst/>
@@ -4652,15 +5473,535 @@
             <a:pPr algn="ctr"/>
             <a:r>
               <a:rPr lang="en-JP" dirty="0"/>
-              <a:t>Landscape</a:t>
-            </a:r>
+              <a:t>Fighting UI</a:t>
+            </a:r>
+          </a:p>
+        </p:txBody>
+      </p:sp>
+      <p:cxnSp>
+        <p:nvCxnSpPr>
+          <p:cNvPr id="17" name="Straight Connector 16">
+            <a:extLst>
+              <a:ext uri="{FF2B5EF4-FFF2-40B4-BE49-F238E27FC236}">
+                <a16:creationId xmlns:a16="http://schemas.microsoft.com/office/drawing/2014/main" id="{236BCCAF-EE1F-CE46-8950-69D1F2255C42}"/>
+              </a:ext>
+            </a:extLst>
+          </p:cNvPr>
+          <p:cNvCxnSpPr>
+            <a:cxnSpLocks/>
+          </p:cNvCxnSpPr>
+          <p:nvPr/>
+        </p:nvCxnSpPr>
+        <p:spPr>
+          <a:xfrm>
+            <a:off x="5878286" y="2833635"/>
+            <a:ext cx="0" cy="2049864"/>
+          </a:xfrm>
+          <a:prstGeom prst="line">
+            <a:avLst/>
+          </a:prstGeom>
+        </p:spPr>
+        <p:style>
+          <a:lnRef idx="1">
+            <a:schemeClr val="accent1"/>
+          </a:lnRef>
+          <a:fillRef idx="0">
+            <a:schemeClr val="accent1"/>
+          </a:fillRef>
+          <a:effectRef idx="0">
+            <a:schemeClr val="accent1"/>
+          </a:effectRef>
+          <a:fontRef idx="minor">
+            <a:schemeClr val="tx1"/>
+          </a:fontRef>
+        </p:style>
+      </p:cxnSp>
+      <p:sp>
+        <p:nvSpPr>
+          <p:cNvPr id="7" name="Content Placeholder 2">
+            <a:extLst>
+              <a:ext uri="{FF2B5EF4-FFF2-40B4-BE49-F238E27FC236}">
+                <a16:creationId xmlns:a16="http://schemas.microsoft.com/office/drawing/2014/main" id="{23EFAC83-E9E2-594B-8831-806DE89872CE}"/>
+              </a:ext>
+            </a:extLst>
+          </p:cNvPr>
+          <p:cNvSpPr txBox="1">
+            <a:spLocks/>
+          </p:cNvSpPr>
+          <p:nvPr/>
+        </p:nvSpPr>
+        <p:spPr>
+          <a:xfrm>
+            <a:off x="2836153" y="2006939"/>
+            <a:ext cx="2528834" cy="3450613"/>
+          </a:xfrm>
+          <a:prstGeom prst="rect">
+            <a:avLst/>
+          </a:prstGeom>
+        </p:spPr>
+        <p:txBody>
+          <a:bodyPr vert="horz" lIns="91440" tIns="45720" rIns="91440" bIns="45720" rtlCol="0" anchor="t">
+            <a:normAutofit/>
+          </a:bodyPr>
+          <a:lstStyle>
+            <a:lvl1pPr marL="228600" indent="-228600" algn="l" defTabSz="914400" rtl="0" eaLnBrk="1" latinLnBrk="0" hangingPunct="1">
+              <a:lnSpc>
+                <a:spcPct val="120000"/>
+              </a:lnSpc>
+              <a:spcBef>
+                <a:spcPts val="1000"/>
+              </a:spcBef>
+              <a:buClr>
+                <a:schemeClr val="accent1"/>
+              </a:buClr>
+              <a:buSzPct val="100000"/>
+              <a:buFont typeface="Arial" panose="020B0604020202020204" pitchFamily="34" charset="0"/>
+              <a:buChar char="•"/>
+              <a:defRPr sz="2000" kern="1200">
+                <a:solidFill>
+                  <a:schemeClr val="tx1"/>
+                </a:solidFill>
+                <a:effectLst/>
+                <a:latin typeface="+mn-lt"/>
+                <a:ea typeface="+mn-ea"/>
+                <a:cs typeface="+mn-cs"/>
+              </a:defRPr>
+            </a:lvl1pPr>
+            <a:lvl2pPr marL="685800" indent="-228600" algn="l" defTabSz="914400" rtl="0" eaLnBrk="1" latinLnBrk="0" hangingPunct="1">
+              <a:lnSpc>
+                <a:spcPct val="120000"/>
+              </a:lnSpc>
+              <a:spcBef>
+                <a:spcPts val="500"/>
+              </a:spcBef>
+              <a:buClr>
+                <a:schemeClr val="accent1"/>
+              </a:buClr>
+              <a:buSzPct val="100000"/>
+              <a:buFont typeface="Arial" panose="020B0604020202020204" pitchFamily="34" charset="0"/>
+              <a:buChar char="•"/>
+              <a:defRPr sz="1800" kern="1200" cap="none" baseline="0">
+                <a:solidFill>
+                  <a:schemeClr val="tx1"/>
+                </a:solidFill>
+                <a:effectLst/>
+                <a:latin typeface="+mn-lt"/>
+                <a:ea typeface="+mn-ea"/>
+                <a:cs typeface="+mn-cs"/>
+              </a:defRPr>
+            </a:lvl2pPr>
+            <a:lvl3pPr marL="1143000" indent="-228600" algn="l" defTabSz="914400" rtl="0" eaLnBrk="1" latinLnBrk="0" hangingPunct="1">
+              <a:lnSpc>
+                <a:spcPct val="120000"/>
+              </a:lnSpc>
+              <a:spcBef>
+                <a:spcPts val="500"/>
+              </a:spcBef>
+              <a:buClr>
+                <a:schemeClr val="accent1"/>
+              </a:buClr>
+              <a:buSzPct val="100000"/>
+              <a:buFont typeface="Arial" panose="020B0604020202020204" pitchFamily="34" charset="0"/>
+              <a:buChar char="•"/>
+              <a:defRPr sz="1600" kern="1200">
+                <a:solidFill>
+                  <a:schemeClr val="tx1"/>
+                </a:solidFill>
+                <a:effectLst/>
+                <a:latin typeface="+mn-lt"/>
+                <a:ea typeface="+mn-ea"/>
+                <a:cs typeface="+mn-cs"/>
+              </a:defRPr>
+            </a:lvl3pPr>
+            <a:lvl4pPr marL="1600200" indent="-228600" algn="l" defTabSz="914400" rtl="0" eaLnBrk="1" latinLnBrk="0" hangingPunct="1">
+              <a:lnSpc>
+                <a:spcPct val="120000"/>
+              </a:lnSpc>
+              <a:spcBef>
+                <a:spcPts val="500"/>
+              </a:spcBef>
+              <a:buClr>
+                <a:schemeClr val="accent1"/>
+              </a:buClr>
+              <a:buSzPct val="100000"/>
+              <a:buFont typeface="Arial" panose="020B0604020202020204" pitchFamily="34" charset="0"/>
+              <a:buChar char="•"/>
+              <a:defRPr sz="1400" kern="1200" cap="none" baseline="0">
+                <a:solidFill>
+                  <a:schemeClr val="tx1"/>
+                </a:solidFill>
+                <a:effectLst/>
+                <a:latin typeface="+mn-lt"/>
+                <a:ea typeface="+mn-ea"/>
+                <a:cs typeface="+mn-cs"/>
+              </a:defRPr>
+            </a:lvl4pPr>
+            <a:lvl5pPr marL="2057400" indent="-228600" algn="l" defTabSz="914400" rtl="0" eaLnBrk="1" latinLnBrk="0" hangingPunct="1">
+              <a:lnSpc>
+                <a:spcPct val="120000"/>
+              </a:lnSpc>
+              <a:spcBef>
+                <a:spcPts val="500"/>
+              </a:spcBef>
+              <a:buClr>
+                <a:schemeClr val="accent1"/>
+              </a:buClr>
+              <a:buSzPct val="100000"/>
+              <a:buFont typeface="Arial" panose="020B0604020202020204" pitchFamily="34" charset="0"/>
+              <a:buChar char="•"/>
+              <a:defRPr sz="1200" kern="1200">
+                <a:solidFill>
+                  <a:schemeClr val="tx1"/>
+                </a:solidFill>
+                <a:effectLst/>
+                <a:latin typeface="+mn-lt"/>
+                <a:ea typeface="+mn-ea"/>
+                <a:cs typeface="+mn-cs"/>
+              </a:defRPr>
+            </a:lvl5pPr>
+            <a:lvl6pPr marL="2514600" indent="-228600" algn="l" defTabSz="914400" rtl="0" eaLnBrk="1" latinLnBrk="0" hangingPunct="1">
+              <a:lnSpc>
+                <a:spcPct val="120000"/>
+              </a:lnSpc>
+              <a:spcBef>
+                <a:spcPts val="500"/>
+              </a:spcBef>
+              <a:buClr>
+                <a:schemeClr val="accent1"/>
+              </a:buClr>
+              <a:buSzPct val="100000"/>
+              <a:buFont typeface="Arial" panose="020B0604020202020204" pitchFamily="34" charset="0"/>
+              <a:buChar char="•"/>
+              <a:defRPr sz="1200" kern="1200">
+                <a:solidFill>
+                  <a:schemeClr val="tx1"/>
+                </a:solidFill>
+                <a:effectLst/>
+                <a:latin typeface="+mn-lt"/>
+                <a:ea typeface="+mn-ea"/>
+                <a:cs typeface="+mn-cs"/>
+              </a:defRPr>
+            </a:lvl6pPr>
+            <a:lvl7pPr marL="2971800" indent="-228600" algn="l" defTabSz="914400" rtl="0" eaLnBrk="1" latinLnBrk="0" hangingPunct="1">
+              <a:lnSpc>
+                <a:spcPct val="120000"/>
+              </a:lnSpc>
+              <a:spcBef>
+                <a:spcPts val="500"/>
+              </a:spcBef>
+              <a:buClr>
+                <a:schemeClr val="accent1"/>
+              </a:buClr>
+              <a:buSzPct val="100000"/>
+              <a:buFont typeface="Arial" panose="020B0604020202020204" pitchFamily="34" charset="0"/>
+              <a:buChar char="•"/>
+              <a:defRPr sz="1200" kern="1200">
+                <a:solidFill>
+                  <a:schemeClr val="tx1"/>
+                </a:solidFill>
+                <a:effectLst/>
+                <a:latin typeface="+mn-lt"/>
+                <a:ea typeface="+mn-ea"/>
+                <a:cs typeface="+mn-cs"/>
+              </a:defRPr>
+            </a:lvl7pPr>
+            <a:lvl8pPr marL="3429000" indent="-228600" algn="l" defTabSz="914400" rtl="0" eaLnBrk="1" latinLnBrk="0" hangingPunct="1">
+              <a:lnSpc>
+                <a:spcPct val="120000"/>
+              </a:lnSpc>
+              <a:spcBef>
+                <a:spcPts val="500"/>
+              </a:spcBef>
+              <a:buClr>
+                <a:schemeClr val="accent1"/>
+              </a:buClr>
+              <a:buSzPct val="100000"/>
+              <a:buFont typeface="Arial" panose="020B0604020202020204" pitchFamily="34" charset="0"/>
+              <a:buChar char="•"/>
+              <a:defRPr sz="1200" kern="1200" baseline="0">
+                <a:solidFill>
+                  <a:schemeClr val="tx1"/>
+                </a:solidFill>
+                <a:effectLst/>
+                <a:latin typeface="+mn-lt"/>
+                <a:ea typeface="+mn-ea"/>
+                <a:cs typeface="+mn-cs"/>
+              </a:defRPr>
+            </a:lvl8pPr>
+            <a:lvl9pPr marL="3886200" indent="-228600" algn="l" defTabSz="914400" rtl="0" eaLnBrk="1" latinLnBrk="0" hangingPunct="1">
+              <a:lnSpc>
+                <a:spcPct val="120000"/>
+              </a:lnSpc>
+              <a:spcBef>
+                <a:spcPts val="500"/>
+              </a:spcBef>
+              <a:buClr>
+                <a:schemeClr val="accent1"/>
+              </a:buClr>
+              <a:buSzPct val="100000"/>
+              <a:buFont typeface="Arial" panose="020B0604020202020204" pitchFamily="34" charset="0"/>
+              <a:buChar char="•"/>
+              <a:defRPr sz="1200" kern="1200" baseline="0">
+                <a:solidFill>
+                  <a:schemeClr val="tx1"/>
+                </a:solidFill>
+                <a:effectLst/>
+                <a:latin typeface="+mn-lt"/>
+                <a:ea typeface="+mn-ea"/>
+                <a:cs typeface="+mn-cs"/>
+              </a:defRPr>
+            </a:lvl9pPr>
+          </a:lstStyle>
+          <a:p>
+            <a:endParaRPr lang="en-JP" dirty="0"/>
+          </a:p>
+        </p:txBody>
+      </p:sp>
+      <p:sp>
+        <p:nvSpPr>
+          <p:cNvPr id="8" name="Content Placeholder 2">
+            <a:extLst>
+              <a:ext uri="{FF2B5EF4-FFF2-40B4-BE49-F238E27FC236}">
+                <a16:creationId xmlns:a16="http://schemas.microsoft.com/office/drawing/2014/main" id="{36A03C59-2CBB-C449-958E-C85CF06E6383}"/>
+              </a:ext>
+            </a:extLst>
+          </p:cNvPr>
+          <p:cNvSpPr txBox="1">
+            <a:spLocks/>
+          </p:cNvSpPr>
+          <p:nvPr/>
+        </p:nvSpPr>
+        <p:spPr>
+          <a:xfrm>
+            <a:off x="8359268" y="1998146"/>
+            <a:ext cx="2528834" cy="3450613"/>
+          </a:xfrm>
+          <a:prstGeom prst="rect">
+            <a:avLst/>
+          </a:prstGeom>
+        </p:spPr>
+        <p:txBody>
+          <a:bodyPr vert="horz" lIns="91440" tIns="45720" rIns="91440" bIns="45720" rtlCol="0" anchor="t">
+            <a:normAutofit/>
+          </a:bodyPr>
+          <a:lstStyle>
+            <a:lvl1pPr marL="228600" indent="-228600" algn="l" defTabSz="914400" rtl="0" eaLnBrk="1" latinLnBrk="0" hangingPunct="1">
+              <a:lnSpc>
+                <a:spcPct val="120000"/>
+              </a:lnSpc>
+              <a:spcBef>
+                <a:spcPts val="1000"/>
+              </a:spcBef>
+              <a:buClr>
+                <a:schemeClr val="accent1"/>
+              </a:buClr>
+              <a:buSzPct val="100000"/>
+              <a:buFont typeface="Arial" panose="020B0604020202020204" pitchFamily="34" charset="0"/>
+              <a:buChar char="•"/>
+              <a:defRPr sz="2000" kern="1200">
+                <a:solidFill>
+                  <a:schemeClr val="tx1"/>
+                </a:solidFill>
+                <a:effectLst/>
+                <a:latin typeface="+mn-lt"/>
+                <a:ea typeface="+mn-ea"/>
+                <a:cs typeface="+mn-cs"/>
+              </a:defRPr>
+            </a:lvl1pPr>
+            <a:lvl2pPr marL="685800" indent="-228600" algn="l" defTabSz="914400" rtl="0" eaLnBrk="1" latinLnBrk="0" hangingPunct="1">
+              <a:lnSpc>
+                <a:spcPct val="120000"/>
+              </a:lnSpc>
+              <a:spcBef>
+                <a:spcPts val="500"/>
+              </a:spcBef>
+              <a:buClr>
+                <a:schemeClr val="accent1"/>
+              </a:buClr>
+              <a:buSzPct val="100000"/>
+              <a:buFont typeface="Arial" panose="020B0604020202020204" pitchFamily="34" charset="0"/>
+              <a:buChar char="•"/>
+              <a:defRPr sz="1800" kern="1200" cap="none" baseline="0">
+                <a:solidFill>
+                  <a:schemeClr val="tx1"/>
+                </a:solidFill>
+                <a:effectLst/>
+                <a:latin typeface="+mn-lt"/>
+                <a:ea typeface="+mn-ea"/>
+                <a:cs typeface="+mn-cs"/>
+              </a:defRPr>
+            </a:lvl2pPr>
+            <a:lvl3pPr marL="1143000" indent="-228600" algn="l" defTabSz="914400" rtl="0" eaLnBrk="1" latinLnBrk="0" hangingPunct="1">
+              <a:lnSpc>
+                <a:spcPct val="120000"/>
+              </a:lnSpc>
+              <a:spcBef>
+                <a:spcPts val="500"/>
+              </a:spcBef>
+              <a:buClr>
+                <a:schemeClr val="accent1"/>
+              </a:buClr>
+              <a:buSzPct val="100000"/>
+              <a:buFont typeface="Arial" panose="020B0604020202020204" pitchFamily="34" charset="0"/>
+              <a:buChar char="•"/>
+              <a:defRPr sz="1600" kern="1200">
+                <a:solidFill>
+                  <a:schemeClr val="tx1"/>
+                </a:solidFill>
+                <a:effectLst/>
+                <a:latin typeface="+mn-lt"/>
+                <a:ea typeface="+mn-ea"/>
+                <a:cs typeface="+mn-cs"/>
+              </a:defRPr>
+            </a:lvl3pPr>
+            <a:lvl4pPr marL="1600200" indent="-228600" algn="l" defTabSz="914400" rtl="0" eaLnBrk="1" latinLnBrk="0" hangingPunct="1">
+              <a:lnSpc>
+                <a:spcPct val="120000"/>
+              </a:lnSpc>
+              <a:spcBef>
+                <a:spcPts val="500"/>
+              </a:spcBef>
+              <a:buClr>
+                <a:schemeClr val="accent1"/>
+              </a:buClr>
+              <a:buSzPct val="100000"/>
+              <a:buFont typeface="Arial" panose="020B0604020202020204" pitchFamily="34" charset="0"/>
+              <a:buChar char="•"/>
+              <a:defRPr sz="1400" kern="1200" cap="none" baseline="0">
+                <a:solidFill>
+                  <a:schemeClr val="tx1"/>
+                </a:solidFill>
+                <a:effectLst/>
+                <a:latin typeface="+mn-lt"/>
+                <a:ea typeface="+mn-ea"/>
+                <a:cs typeface="+mn-cs"/>
+              </a:defRPr>
+            </a:lvl4pPr>
+            <a:lvl5pPr marL="2057400" indent="-228600" algn="l" defTabSz="914400" rtl="0" eaLnBrk="1" latinLnBrk="0" hangingPunct="1">
+              <a:lnSpc>
+                <a:spcPct val="120000"/>
+              </a:lnSpc>
+              <a:spcBef>
+                <a:spcPts val="500"/>
+              </a:spcBef>
+              <a:buClr>
+                <a:schemeClr val="accent1"/>
+              </a:buClr>
+              <a:buSzPct val="100000"/>
+              <a:buFont typeface="Arial" panose="020B0604020202020204" pitchFamily="34" charset="0"/>
+              <a:buChar char="•"/>
+              <a:defRPr sz="1200" kern="1200">
+                <a:solidFill>
+                  <a:schemeClr val="tx1"/>
+                </a:solidFill>
+                <a:effectLst/>
+                <a:latin typeface="+mn-lt"/>
+                <a:ea typeface="+mn-ea"/>
+                <a:cs typeface="+mn-cs"/>
+              </a:defRPr>
+            </a:lvl5pPr>
+            <a:lvl6pPr marL="2514600" indent="-228600" algn="l" defTabSz="914400" rtl="0" eaLnBrk="1" latinLnBrk="0" hangingPunct="1">
+              <a:lnSpc>
+                <a:spcPct val="120000"/>
+              </a:lnSpc>
+              <a:spcBef>
+                <a:spcPts val="500"/>
+              </a:spcBef>
+              <a:buClr>
+                <a:schemeClr val="accent1"/>
+              </a:buClr>
+              <a:buSzPct val="100000"/>
+              <a:buFont typeface="Arial" panose="020B0604020202020204" pitchFamily="34" charset="0"/>
+              <a:buChar char="•"/>
+              <a:defRPr sz="1200" kern="1200">
+                <a:solidFill>
+                  <a:schemeClr val="tx1"/>
+                </a:solidFill>
+                <a:effectLst/>
+                <a:latin typeface="+mn-lt"/>
+                <a:ea typeface="+mn-ea"/>
+                <a:cs typeface="+mn-cs"/>
+              </a:defRPr>
+            </a:lvl6pPr>
+            <a:lvl7pPr marL="2971800" indent="-228600" algn="l" defTabSz="914400" rtl="0" eaLnBrk="1" latinLnBrk="0" hangingPunct="1">
+              <a:lnSpc>
+                <a:spcPct val="120000"/>
+              </a:lnSpc>
+              <a:spcBef>
+                <a:spcPts val="500"/>
+              </a:spcBef>
+              <a:buClr>
+                <a:schemeClr val="accent1"/>
+              </a:buClr>
+              <a:buSzPct val="100000"/>
+              <a:buFont typeface="Arial" panose="020B0604020202020204" pitchFamily="34" charset="0"/>
+              <a:buChar char="•"/>
+              <a:defRPr sz="1200" kern="1200">
+                <a:solidFill>
+                  <a:schemeClr val="tx1"/>
+                </a:solidFill>
+                <a:effectLst/>
+                <a:latin typeface="+mn-lt"/>
+                <a:ea typeface="+mn-ea"/>
+                <a:cs typeface="+mn-cs"/>
+              </a:defRPr>
+            </a:lvl7pPr>
+            <a:lvl8pPr marL="3429000" indent="-228600" algn="l" defTabSz="914400" rtl="0" eaLnBrk="1" latinLnBrk="0" hangingPunct="1">
+              <a:lnSpc>
+                <a:spcPct val="120000"/>
+              </a:lnSpc>
+              <a:spcBef>
+                <a:spcPts val="500"/>
+              </a:spcBef>
+              <a:buClr>
+                <a:schemeClr val="accent1"/>
+              </a:buClr>
+              <a:buSzPct val="100000"/>
+              <a:buFont typeface="Arial" panose="020B0604020202020204" pitchFamily="34" charset="0"/>
+              <a:buChar char="•"/>
+              <a:defRPr sz="1200" kern="1200" baseline="0">
+                <a:solidFill>
+                  <a:schemeClr val="tx1"/>
+                </a:solidFill>
+                <a:effectLst/>
+                <a:latin typeface="+mn-lt"/>
+                <a:ea typeface="+mn-ea"/>
+                <a:cs typeface="+mn-cs"/>
+              </a:defRPr>
+            </a:lvl8pPr>
+            <a:lvl9pPr marL="3886200" indent="-228600" algn="l" defTabSz="914400" rtl="0" eaLnBrk="1" latinLnBrk="0" hangingPunct="1">
+              <a:lnSpc>
+                <a:spcPct val="120000"/>
+              </a:lnSpc>
+              <a:spcBef>
+                <a:spcPts val="500"/>
+              </a:spcBef>
+              <a:buClr>
+                <a:schemeClr val="accent1"/>
+              </a:buClr>
+              <a:buSzPct val="100000"/>
+              <a:buFont typeface="Arial" panose="020B0604020202020204" pitchFamily="34" charset="0"/>
+              <a:buChar char="•"/>
+              <a:defRPr sz="1200" kern="1200" baseline="0">
+                <a:solidFill>
+                  <a:schemeClr val="tx1"/>
+                </a:solidFill>
+                <a:effectLst/>
+                <a:latin typeface="+mn-lt"/>
+                <a:ea typeface="+mn-ea"/>
+                <a:cs typeface="+mn-cs"/>
+              </a:defRPr>
+            </a:lvl9pPr>
+          </a:lstStyle>
+          <a:p>
+            <a:endParaRPr lang="en-JP" dirty="0"/>
           </a:p>
         </p:txBody>
       </p:sp>
     </p:spTree>
     <p:extLst>
       <p:ext uri="{BB962C8B-B14F-4D97-AF65-F5344CB8AC3E}">
-        <p14:creationId xmlns:p14="http://schemas.microsoft.com/office/powerpoint/2010/main" val="2125633770"/>
+        <p14:creationId xmlns:p14="http://schemas.microsoft.com/office/powerpoint/2010/main" val="2809405019"/>
       </p:ext>
     </p:extLst>
   </p:cSld>
@@ -4692,7 +6033,7 @@
           <p:cNvPr id="2" name="Title 1">
             <a:extLst>
               <a:ext uri="{FF2B5EF4-FFF2-40B4-BE49-F238E27FC236}">
-                <a16:creationId xmlns:a16="http://schemas.microsoft.com/office/drawing/2014/main" id="{862A8143-C5BE-844C-A5AB-23B6C9BC6A6A}"/>
+                <a16:creationId xmlns:a16="http://schemas.microsoft.com/office/drawing/2014/main" id="{AA686CA0-1EAB-524E-81EE-3AC308AA15EF}"/>
               </a:ext>
             </a:extLst>
           </p:cNvPr>
@@ -4703,108 +6044,139 @@
             <p:ph type="title"/>
           </p:nvPr>
         </p:nvSpPr>
-        <p:spPr/>
+        <p:spPr>
+          <a:xfrm>
+            <a:off x="1451579" y="804519"/>
+            <a:ext cx="9603275" cy="1049235"/>
+          </a:xfrm>
+        </p:spPr>
         <p:txBody>
           <a:bodyPr/>
           <a:lstStyle/>
           <a:p>
             <a:r>
-              <a:rPr lang="en-US" cap="none" dirty="0"/>
-              <a:t>Brandish </a:t>
-            </a:r>
-            <a:r>
-              <a:rPr lang="ja-JP" altLang="en-US" cap="none"/>
-              <a:t>の売りとは？</a:t>
-            </a:r>
-            <a:endParaRPr lang="en-JP" cap="none" dirty="0"/>
-          </a:p>
-        </p:txBody>
-      </p:sp>
-      <p:sp>
-        <p:nvSpPr>
-          <p:cNvPr id="3" name="Content Placeholder 2">
+              <a:rPr lang="ja-JP" altLang="en-US">
+                <a:latin typeface="Yu Gothic" panose="020B0400000000000000" pitchFamily="34" charset="-128"/>
+                <a:ea typeface="Yu Gothic" panose="020B0400000000000000" pitchFamily="34" charset="-128"/>
+              </a:rPr>
+              <a:t>横画面</a:t>
+            </a:r>
+            <a:r>
+              <a:rPr lang="en-US" altLang="ja-JP" dirty="0">
+                <a:latin typeface="Yu Gothic" panose="020B0400000000000000" pitchFamily="34" charset="-128"/>
+                <a:ea typeface="Yu Gothic" panose="020B0400000000000000" pitchFamily="34" charset="-128"/>
+              </a:rPr>
+              <a:t> UI</a:t>
+            </a:r>
+            <a:endParaRPr lang="en-JP" dirty="0">
+              <a:latin typeface="Yu Gothic" panose="020B0400000000000000" pitchFamily="34" charset="-128"/>
+              <a:ea typeface="Yu Gothic" panose="020B0400000000000000" pitchFamily="34" charset="-128"/>
+            </a:endParaRPr>
+          </a:p>
+        </p:txBody>
+      </p:sp>
+      <p:sp>
+        <p:nvSpPr>
+          <p:cNvPr id="13" name="Rounded Rectangle 12">
             <a:extLst>
               <a:ext uri="{FF2B5EF4-FFF2-40B4-BE49-F238E27FC236}">
-                <a16:creationId xmlns:a16="http://schemas.microsoft.com/office/drawing/2014/main" id="{D2F772A8-1113-1946-9AAF-6F319DB506B2}"/>
+                <a16:creationId xmlns:a16="http://schemas.microsoft.com/office/drawing/2014/main" id="{BBE55EDF-2B51-DC42-B697-88BB8030D1F3}"/>
               </a:ext>
             </a:extLst>
           </p:cNvPr>
-          <p:cNvSpPr>
-            <a:spLocks noGrp="1"/>
-          </p:cNvSpPr>
-          <p:nvPr>
-            <p:ph idx="1"/>
-          </p:nvPr>
+          <p:cNvSpPr/>
+          <p:nvPr/>
         </p:nvSpPr>
         <p:spPr>
           <a:xfrm>
-            <a:off x="1451579" y="2015732"/>
-            <a:ext cx="9722188" cy="3450613"/>
+            <a:off x="874208" y="3547067"/>
+            <a:ext cx="1075172" cy="1919277"/>
           </a:xfrm>
+          <a:prstGeom prst="roundRect">
+            <a:avLst/>
+          </a:prstGeom>
         </p:spPr>
-        <p:txBody>
-          <a:bodyPr/>
-          <a:lstStyle/>
-          <a:p>
-            <a:r>
-              <a:rPr lang="en-US" b="1" dirty="0">
-                <a:solidFill>
-                  <a:srgbClr val="0070C0"/>
-                </a:solidFill>
-              </a:rPr>
-              <a:t>Third Person </a:t>
-            </a:r>
-            <a:r>
-              <a:rPr lang="ja-JP" altLang="en-US" b="1">
-                <a:solidFill>
-                  <a:srgbClr val="0070C0"/>
-                </a:solidFill>
-              </a:rPr>
-              <a:t>視点</a:t>
-            </a:r>
-            <a:r>
-              <a:rPr lang="ja-JP" altLang="en-US" b="1"/>
-              <a:t>でありながら、</a:t>
-            </a:r>
-            <a:br>
-              <a:rPr lang="en-US" altLang="ja-JP" b="1" dirty="0"/>
-            </a:br>
-            <a:r>
-              <a:rPr lang="ja-JP" altLang="en-US" b="1"/>
-              <a:t>まるで</a:t>
-            </a:r>
-            <a:r>
-              <a:rPr lang="ja-JP" altLang="en-US" b="1">
-                <a:solidFill>
-                  <a:srgbClr val="0070C0"/>
-                </a:solidFill>
-              </a:rPr>
-              <a:t>一人称</a:t>
-            </a:r>
-            <a:r>
-              <a:rPr lang="ja-JP" altLang="en-US" b="1"/>
-              <a:t>としてそこにいるかのような臨場感</a:t>
-            </a:r>
-          </a:p>
-          <a:p>
-            <a:r>
-              <a:rPr lang="ja-JP" altLang="en-US"/>
-              <a:t>タイルマップ移動方式の独特な操作感</a:t>
-            </a:r>
-          </a:p>
-          <a:p>
-            <a:r>
-              <a:rPr lang="ja-JP" altLang="en-US"/>
-              <a:t>ルールの決まった動きの中でのパズル・謎解き要素</a:t>
-            </a:r>
-            <a:endParaRPr lang="en-JP" dirty="0"/>
+        <p:style>
+          <a:lnRef idx="2">
+            <a:schemeClr val="accent1">
+              <a:shade val="50000"/>
+            </a:schemeClr>
+          </a:lnRef>
+          <a:fillRef idx="1">
+            <a:schemeClr val="accent1"/>
+          </a:fillRef>
+          <a:effectRef idx="0">
+            <a:schemeClr val="accent1"/>
+          </a:effectRef>
+          <a:fontRef idx="minor">
+            <a:schemeClr val="lt1"/>
+          </a:fontRef>
+        </p:style>
+        <p:txBody>
+          <a:bodyPr rtlCol="0" anchor="ctr"/>
+          <a:lstStyle/>
+          <a:p>
+            <a:pPr algn="ctr"/>
+            <a:r>
+              <a:rPr lang="en-JP" dirty="0"/>
+              <a:t>Portrate</a:t>
+            </a:r>
+          </a:p>
+        </p:txBody>
+      </p:sp>
+      <p:sp>
+        <p:nvSpPr>
+          <p:cNvPr id="7" name="Rounded Rectangle 6">
+            <a:extLst>
+              <a:ext uri="{FF2B5EF4-FFF2-40B4-BE49-F238E27FC236}">
+                <a16:creationId xmlns:a16="http://schemas.microsoft.com/office/drawing/2014/main" id="{3E1D37A7-39E7-B64D-82B3-5F1EE3939C27}"/>
+              </a:ext>
+            </a:extLst>
+          </p:cNvPr>
+          <p:cNvSpPr/>
+          <p:nvPr/>
+        </p:nvSpPr>
+        <p:spPr>
+          <a:xfrm>
+            <a:off x="3389645" y="2382038"/>
+            <a:ext cx="6558223" cy="3084306"/>
+          </a:xfrm>
+          <a:prstGeom prst="roundRect">
+            <a:avLst/>
+          </a:prstGeom>
+        </p:spPr>
+        <p:style>
+          <a:lnRef idx="2">
+            <a:schemeClr val="accent1">
+              <a:shade val="50000"/>
+            </a:schemeClr>
+          </a:lnRef>
+          <a:fillRef idx="1">
+            <a:schemeClr val="accent1"/>
+          </a:fillRef>
+          <a:effectRef idx="0">
+            <a:schemeClr val="accent1"/>
+          </a:effectRef>
+          <a:fontRef idx="minor">
+            <a:schemeClr val="lt1"/>
+          </a:fontRef>
+        </p:style>
+        <p:txBody>
+          <a:bodyPr rtlCol="0" anchor="ctr"/>
+          <a:lstStyle/>
+          <a:p>
+            <a:pPr algn="ctr"/>
+            <a:r>
+              <a:rPr lang="en-JP" dirty="0"/>
+              <a:t>Landscape</a:t>
+            </a:r>
           </a:p>
         </p:txBody>
       </p:sp>
     </p:spTree>
     <p:extLst>
       <p:ext uri="{BB962C8B-B14F-4D97-AF65-F5344CB8AC3E}">
-        <p14:creationId xmlns:p14="http://schemas.microsoft.com/office/powerpoint/2010/main" val="4062444840"/>
+        <p14:creationId xmlns:p14="http://schemas.microsoft.com/office/powerpoint/2010/main" val="2125633770"/>
       </p:ext>
     </p:extLst>
   </p:cSld>
@@ -4836,7 +6208,7 @@
           <p:cNvPr id="2" name="Title 1">
             <a:extLst>
               <a:ext uri="{FF2B5EF4-FFF2-40B4-BE49-F238E27FC236}">
-                <a16:creationId xmlns:a16="http://schemas.microsoft.com/office/drawing/2014/main" id="{5ECB3343-EDB0-8340-ABE7-B0D849C3B4CE}"/>
+                <a16:creationId xmlns:a16="http://schemas.microsoft.com/office/drawing/2014/main" id="{862A8143-C5BE-844C-A5AB-23B6C9BC6A6A}"/>
               </a:ext>
             </a:extLst>
           </p:cNvPr>
@@ -4847,49 +6219,20 @@
             <p:ph type="title"/>
           </p:nvPr>
         </p:nvSpPr>
-        <p:spPr>
-          <a:xfrm>
-            <a:off x="1451579" y="734181"/>
-            <a:ext cx="10261034" cy="1049235"/>
-          </a:xfrm>
-        </p:spPr>
-        <p:txBody>
-          <a:bodyPr>
-            <a:noAutofit/>
-          </a:bodyPr>
-          <a:lstStyle/>
-          <a:p>
-            <a:r>
-              <a:rPr lang="en-US" sz="3600" b="1" cap="none" dirty="0">
-                <a:latin typeface="Yu Gothic" panose="020B0400000000000000" pitchFamily="34" charset="-128"/>
-                <a:ea typeface="Yu Gothic" panose="020B0400000000000000" pitchFamily="34" charset="-128"/>
-              </a:rPr>
-              <a:t>Third Person </a:t>
-            </a:r>
-            <a:r>
-              <a:rPr lang="ja-JP" altLang="en-US" sz="3600" b="1" cap="none">
-                <a:latin typeface="Yu Gothic" panose="020B0400000000000000" pitchFamily="34" charset="-128"/>
-                <a:ea typeface="Yu Gothic" panose="020B0400000000000000" pitchFamily="34" charset="-128"/>
-              </a:rPr>
-              <a:t>視点でありながら、</a:t>
-            </a:r>
-            <a:br>
-              <a:rPr lang="en-US" altLang="ja-JP" sz="3600" b="1" cap="none" dirty="0">
-                <a:latin typeface="Yu Gothic" panose="020B0400000000000000" pitchFamily="34" charset="-128"/>
-                <a:ea typeface="Yu Gothic" panose="020B0400000000000000" pitchFamily="34" charset="-128"/>
-              </a:rPr>
-            </a:br>
-            <a:r>
-              <a:rPr lang="ja-JP" altLang="en-US" sz="3600" b="1" cap="none">
-                <a:latin typeface="Yu Gothic" panose="020B0400000000000000" pitchFamily="34" charset="-128"/>
-                <a:ea typeface="Yu Gothic" panose="020B0400000000000000" pitchFamily="34" charset="-128"/>
-              </a:rPr>
-              <a:t>まるで一人称としてそこにいるかのような臨場感</a:t>
-            </a:r>
-            <a:endParaRPr lang="en-JP" sz="3600" b="1" cap="none" dirty="0">
-              <a:latin typeface="Yu Gothic" panose="020B0400000000000000" pitchFamily="34" charset="-128"/>
-              <a:ea typeface="Yu Gothic" panose="020B0400000000000000" pitchFamily="34" charset="-128"/>
-            </a:endParaRPr>
+        <p:spPr/>
+        <p:txBody>
+          <a:bodyPr/>
+          <a:lstStyle/>
+          <a:p>
+            <a:r>
+              <a:rPr lang="en-US" cap="none" dirty="0"/>
+              <a:t>Brandish </a:t>
+            </a:r>
+            <a:r>
+              <a:rPr lang="ja-JP" altLang="en-US" cap="none"/>
+              <a:t>の売りとは？</a:t>
+            </a:r>
+            <a:endParaRPr lang="en-JP" cap="none" dirty="0"/>
           </a:p>
         </p:txBody>
       </p:sp>
@@ -4898,7 +6241,7 @@
           <p:cNvPr id="3" name="Content Placeholder 2">
             <a:extLst>
               <a:ext uri="{FF2B5EF4-FFF2-40B4-BE49-F238E27FC236}">
-                <a16:creationId xmlns:a16="http://schemas.microsoft.com/office/drawing/2014/main" id="{B47DFD78-DCD5-6D4A-8D37-5D78924AF41F}"/>
+                <a16:creationId xmlns:a16="http://schemas.microsoft.com/office/drawing/2014/main" id="{D2F772A8-1113-1946-9AAF-6F319DB506B2}"/>
               </a:ext>
             </a:extLst>
           </p:cNvPr>
@@ -4909,23 +6252,75 @@
             <p:ph idx="1"/>
           </p:nvPr>
         </p:nvSpPr>
-        <p:spPr/>
-        <p:txBody>
-          <a:bodyPr anchor="ctr"/>
-          <a:lstStyle/>
-          <a:p>
-            <a:pPr algn="ctr"/>
-            <a:r>
-              <a:rPr lang="en-JP" dirty="0"/>
-              <a:t>何がすごいのか？</a:t>
-            </a:r>
+        <p:spPr>
+          <a:xfrm>
+            <a:off x="1451579" y="2015732"/>
+            <a:ext cx="9722188" cy="3450613"/>
+          </a:xfrm>
+        </p:spPr>
+        <p:txBody>
+          <a:bodyPr/>
+          <a:lstStyle/>
+          <a:p>
+            <a:r>
+              <a:rPr lang="en-US" b="1" dirty="0">
+                <a:solidFill>
+                  <a:srgbClr val="0070C0"/>
+                </a:solidFill>
+              </a:rPr>
+              <a:t>Third Person </a:t>
+            </a:r>
+            <a:r>
+              <a:rPr lang="ja-JP" altLang="en-US" b="1">
+                <a:solidFill>
+                  <a:srgbClr val="0070C0"/>
+                </a:solidFill>
+              </a:rPr>
+              <a:t>視点</a:t>
+            </a:r>
+            <a:r>
+              <a:rPr lang="ja-JP" altLang="en-US" b="1"/>
+              <a:t>でありながら、</a:t>
+            </a:r>
+            <a:br>
+              <a:rPr lang="en-US" altLang="ja-JP" b="1" dirty="0"/>
+            </a:br>
+            <a:r>
+              <a:rPr lang="ja-JP" altLang="en-US" b="1"/>
+              <a:t>まるで</a:t>
+            </a:r>
+            <a:r>
+              <a:rPr lang="ja-JP" altLang="en-US" b="1">
+                <a:solidFill>
+                  <a:srgbClr val="0070C0"/>
+                </a:solidFill>
+              </a:rPr>
+              <a:t>一人称</a:t>
+            </a:r>
+            <a:r>
+              <a:rPr lang="ja-JP" altLang="en-US" b="1"/>
+              <a:t>としてそこにいるかのような臨場感</a:t>
+            </a:r>
+          </a:p>
+          <a:p>
+            <a:r>
+              <a:rPr lang="ja-JP" altLang="en-US"/>
+              <a:t>タイルマップ移動方式の独特な操作感</a:t>
+            </a:r>
+          </a:p>
+          <a:p>
+            <a:r>
+              <a:rPr lang="ja-JP" altLang="en-US"/>
+              <a:t>ルールの決まった動きの中でのパズル・謎解き要素</a:t>
+            </a:r>
+            <a:endParaRPr lang="en-JP" dirty="0"/>
           </a:p>
         </p:txBody>
       </p:sp>
     </p:spTree>
     <p:extLst>
       <p:ext uri="{BB962C8B-B14F-4D97-AF65-F5344CB8AC3E}">
-        <p14:creationId xmlns:p14="http://schemas.microsoft.com/office/powerpoint/2010/main" val="2715575130"/>
+        <p14:creationId xmlns:p14="http://schemas.microsoft.com/office/powerpoint/2010/main" val="4062444840"/>
       </p:ext>
     </p:extLst>
   </p:cSld>
@@ -4957,7 +6352,7 @@
           <p:cNvPr id="2" name="Title 1">
             <a:extLst>
               <a:ext uri="{FF2B5EF4-FFF2-40B4-BE49-F238E27FC236}">
-                <a16:creationId xmlns:a16="http://schemas.microsoft.com/office/drawing/2014/main" id="{FE41283E-10C4-2C4A-A278-4B0E529F0508}"/>
+                <a16:creationId xmlns:a16="http://schemas.microsoft.com/office/drawing/2014/main" id="{5ECB3343-EDB0-8340-ABE7-B0D849C3B4CE}"/>
               </a:ext>
             </a:extLst>
           </p:cNvPr>
@@ -4968,18 +6363,50 @@
             <p:ph type="title"/>
           </p:nvPr>
         </p:nvSpPr>
-        <p:spPr/>
-        <p:txBody>
-          <a:bodyPr/>
-          <a:lstStyle/>
-          <a:p>
-            <a:r>
-              <a:rPr lang="en-JP" cap="none" dirty="0">
+        <p:spPr>
+          <a:xfrm>
+            <a:off x="1451579" y="734181"/>
+            <a:ext cx="7803739" cy="1049235"/>
+          </a:xfrm>
+        </p:spPr>
+        <p:txBody>
+          <a:bodyPr>
+            <a:noAutofit/>
+          </a:bodyPr>
+          <a:lstStyle/>
+          <a:p>
+            <a:pPr algn="ctr"/>
+            <a:r>
+              <a:rPr lang="en-US" sz="3600" b="1" cap="none" dirty="0">
                 <a:latin typeface="Yu Gothic" panose="020B0400000000000000" pitchFamily="34" charset="-128"/>
                 <a:ea typeface="Yu Gothic" panose="020B0400000000000000" pitchFamily="34" charset="-128"/>
               </a:rPr>
-              <a:t>First Person 視点の良さ</a:t>
-            </a:r>
+              <a:t>Third Person </a:t>
+            </a:r>
+            <a:r>
+              <a:rPr lang="ja-JP" altLang="en-US" sz="3600" b="1" cap="none">
+                <a:latin typeface="Yu Gothic" panose="020B0400000000000000" pitchFamily="34" charset="-128"/>
+                <a:ea typeface="Yu Gothic" panose="020B0400000000000000" pitchFamily="34" charset="-128"/>
+              </a:rPr>
+              <a:t>視点でありながら</a:t>
+            </a:r>
+            <a:br>
+              <a:rPr lang="en-US" altLang="ja-JP" sz="3600" b="1" cap="none" dirty="0">
+                <a:latin typeface="Yu Gothic" panose="020B0400000000000000" pitchFamily="34" charset="-128"/>
+                <a:ea typeface="Yu Gothic" panose="020B0400000000000000" pitchFamily="34" charset="-128"/>
+              </a:rPr>
+            </a:br>
+            <a:r>
+              <a:rPr lang="ja-JP" altLang="en-US" sz="3600" b="1" cap="none">
+                <a:latin typeface="Yu Gothic" panose="020B0400000000000000" pitchFamily="34" charset="-128"/>
+                <a:ea typeface="Yu Gothic" panose="020B0400000000000000" pitchFamily="34" charset="-128"/>
+              </a:rPr>
+              <a:t>まるで一人称</a:t>
+            </a:r>
+            <a:endParaRPr lang="en-JP" sz="3600" b="1" cap="none" dirty="0">
+              <a:latin typeface="Yu Gothic" panose="020B0400000000000000" pitchFamily="34" charset="-128"/>
+              <a:ea typeface="Yu Gothic" panose="020B0400000000000000" pitchFamily="34" charset="-128"/>
+            </a:endParaRPr>
           </a:p>
         </p:txBody>
       </p:sp>
@@ -4988,7 +6415,7 @@
           <p:cNvPr id="3" name="Content Placeholder 2">
             <a:extLst>
               <a:ext uri="{FF2B5EF4-FFF2-40B4-BE49-F238E27FC236}">
-                <a16:creationId xmlns:a16="http://schemas.microsoft.com/office/drawing/2014/main" id="{65692BDB-BBCF-D04F-9D53-712FFEC8477E}"/>
+                <a16:creationId xmlns:a16="http://schemas.microsoft.com/office/drawing/2014/main" id="{B47DFD78-DCD5-6D4A-8D37-5D78924AF41F}"/>
               </a:ext>
             </a:extLst>
           </p:cNvPr>
@@ -5001,17 +6428,21 @@
         </p:nvSpPr>
         <p:spPr/>
         <p:txBody>
-          <a:bodyPr/>
-          <a:lstStyle/>
-          <a:p>
-            <a:endParaRPr lang="en-JP"/>
+          <a:bodyPr anchor="ctr"/>
+          <a:lstStyle/>
+          <a:p>
+            <a:pPr algn="ctr"/>
+            <a:r>
+              <a:rPr lang="en-JP" dirty="0"/>
+              <a:t>何がすごいのか？</a:t>
+            </a:r>
           </a:p>
         </p:txBody>
       </p:sp>
     </p:spTree>
     <p:extLst>
       <p:ext uri="{BB962C8B-B14F-4D97-AF65-F5344CB8AC3E}">
-        <p14:creationId xmlns:p14="http://schemas.microsoft.com/office/powerpoint/2010/main" val="2718208650"/>
+        <p14:creationId xmlns:p14="http://schemas.microsoft.com/office/powerpoint/2010/main" val="2715575130"/>
       </p:ext>
     </p:extLst>
   </p:cSld>
@@ -5040,35 +6471,10 @@
       </p:grpSpPr>
       <p:sp>
         <p:nvSpPr>
-          <p:cNvPr id="3" name="Content Placeholder 2">
+          <p:cNvPr id="2" name="Title 1">
             <a:extLst>
               <a:ext uri="{FF2B5EF4-FFF2-40B4-BE49-F238E27FC236}">
-                <a16:creationId xmlns:a16="http://schemas.microsoft.com/office/drawing/2014/main" id="{91A5B00C-B2D0-7146-8FBA-A5DE2EFACD00}"/>
-              </a:ext>
-            </a:extLst>
-          </p:cNvPr>
-          <p:cNvSpPr>
-            <a:spLocks noGrp="1"/>
-          </p:cNvSpPr>
-          <p:nvPr>
-            <p:ph idx="1"/>
-          </p:nvPr>
-        </p:nvSpPr>
-        <p:spPr/>
-        <p:txBody>
-          <a:bodyPr/>
-          <a:lstStyle/>
-          <a:p>
-            <a:endParaRPr lang="en-JP"/>
-          </a:p>
-        </p:txBody>
-      </p:sp>
-      <p:sp>
-        <p:nvSpPr>
-          <p:cNvPr id="4" name="Title 1">
-            <a:extLst>
-              <a:ext uri="{FF2B5EF4-FFF2-40B4-BE49-F238E27FC236}">
-                <a16:creationId xmlns:a16="http://schemas.microsoft.com/office/drawing/2014/main" id="{FC9FB8C4-7A0B-A544-8184-B4238F2FCE9A}"/>
+                <a16:creationId xmlns:a16="http://schemas.microsoft.com/office/drawing/2014/main" id="{FE41283E-10C4-2C4A-A278-4B0E529F0508}"/>
               </a:ext>
             </a:extLst>
           </p:cNvPr>
@@ -5089,7 +6495,35 @@
                 <a:latin typeface="Yu Gothic" panose="020B0400000000000000" pitchFamily="34" charset="-128"/>
                 <a:ea typeface="Yu Gothic" panose="020B0400000000000000" pitchFamily="34" charset="-128"/>
               </a:rPr>
-              <a:t>First Person 視点の弱点</a:t>
+              <a:t>First Person 視点の良さ</a:t>
+            </a:r>
+          </a:p>
+        </p:txBody>
+      </p:sp>
+      <p:sp>
+        <p:nvSpPr>
+          <p:cNvPr id="3" name="Content Placeholder 2">
+            <a:extLst>
+              <a:ext uri="{FF2B5EF4-FFF2-40B4-BE49-F238E27FC236}">
+                <a16:creationId xmlns:a16="http://schemas.microsoft.com/office/drawing/2014/main" id="{65692BDB-BBCF-D04F-9D53-712FFEC8477E}"/>
+              </a:ext>
+            </a:extLst>
+          </p:cNvPr>
+          <p:cNvSpPr>
+            <a:spLocks noGrp="1"/>
+          </p:cNvSpPr>
+          <p:nvPr>
+            <p:ph idx="1"/>
+          </p:nvPr>
+        </p:nvSpPr>
+        <p:spPr/>
+        <p:txBody>
+          <a:bodyPr/>
+          <a:lstStyle/>
+          <a:p>
+            <a:r>
+              <a:rPr lang="en-JP" dirty="0"/>
+              <a:t>最新イースの画像</a:t>
             </a:r>
           </a:p>
         </p:txBody>
@@ -5097,7 +6531,7 @@
     </p:spTree>
     <p:extLst>
       <p:ext uri="{BB962C8B-B14F-4D97-AF65-F5344CB8AC3E}">
-        <p14:creationId xmlns:p14="http://schemas.microsoft.com/office/powerpoint/2010/main" val="2215629917"/>
+        <p14:creationId xmlns:p14="http://schemas.microsoft.com/office/powerpoint/2010/main" val="2718208650"/>
       </p:ext>
     </p:extLst>
   </p:cSld>
@@ -5129,7 +6563,7 @@
           <p:cNvPr id="3" name="Content Placeholder 2">
             <a:extLst>
               <a:ext uri="{FF2B5EF4-FFF2-40B4-BE49-F238E27FC236}">
-                <a16:creationId xmlns:a16="http://schemas.microsoft.com/office/drawing/2014/main" id="{28214307-13DC-1D42-B137-0037B181FEEE}"/>
+                <a16:creationId xmlns:a16="http://schemas.microsoft.com/office/drawing/2014/main" id="{91A5B00C-B2D0-7146-8FBA-A5DE2EFACD00}"/>
               </a:ext>
             </a:extLst>
           </p:cNvPr>
@@ -5154,7 +6588,7 @@
           <p:cNvPr id="4" name="Title 1">
             <a:extLst>
               <a:ext uri="{FF2B5EF4-FFF2-40B4-BE49-F238E27FC236}">
-                <a16:creationId xmlns:a16="http://schemas.microsoft.com/office/drawing/2014/main" id="{15CC04E2-9B8C-5843-A923-B394EB9846B1}"/>
+                <a16:creationId xmlns:a16="http://schemas.microsoft.com/office/drawing/2014/main" id="{FC9FB8C4-7A0B-A544-8184-B4238F2FCE9A}"/>
               </a:ext>
             </a:extLst>
           </p:cNvPr>
@@ -5171,29 +6605,19 @@
           <a:lstStyle/>
           <a:p>
             <a:r>
-              <a:rPr lang="ja-JP" altLang="en-US" cap="none"/>
-              <a:t>パズル的面白さの追求</a:t>
-            </a:r>
-            <a:r>
-              <a:rPr lang="en-US" altLang="ja-JP" cap="none" dirty="0"/>
-              <a:t>(</a:t>
-            </a:r>
-            <a:r>
-              <a:rPr lang="ja-JP" altLang="en-US" cap="none"/>
-              <a:t>の重要性</a:t>
-            </a:r>
-            <a:r>
-              <a:rPr lang="en-US" altLang="ja-JP" cap="none" dirty="0"/>
-              <a:t>)</a:t>
-            </a:r>
-            <a:endParaRPr lang="en-JP" cap="none" dirty="0"/>
+              <a:rPr lang="en-JP" cap="none" dirty="0">
+                <a:latin typeface="Yu Gothic" panose="020B0400000000000000" pitchFamily="34" charset="-128"/>
+                <a:ea typeface="Yu Gothic" panose="020B0400000000000000" pitchFamily="34" charset="-128"/>
+              </a:rPr>
+              <a:t>First Person 視点の弱点</a:t>
+            </a:r>
           </a:p>
         </p:txBody>
       </p:sp>
     </p:spTree>
     <p:extLst>
       <p:ext uri="{BB962C8B-B14F-4D97-AF65-F5344CB8AC3E}">
-        <p14:creationId xmlns:p14="http://schemas.microsoft.com/office/powerpoint/2010/main" val="2851007069"/>
+        <p14:creationId xmlns:p14="http://schemas.microsoft.com/office/powerpoint/2010/main" val="2215629917"/>
       </p:ext>
     </p:extLst>
   </p:cSld>

</xml_diff>